<commit_message>
ppt se agrega algun codigo de ejemplo sensores
</commit_message>
<xml_diff>
--- a/Arduino/arduino.pptx
+++ b/Arduino/arduino.pptx
@@ -14,13 +14,16 @@
     <p:sldId id="260" r:id="rId8"/>
     <p:sldId id="258" r:id="rId9"/>
     <p:sldId id="266" r:id="rId10"/>
-    <p:sldId id="259" r:id="rId11"/>
-    <p:sldId id="267" r:id="rId12"/>
-    <p:sldId id="268" r:id="rId13"/>
-    <p:sldId id="261" r:id="rId14"/>
-    <p:sldId id="257" r:id="rId15"/>
-    <p:sldId id="262" r:id="rId16"/>
-    <p:sldId id="269" r:id="rId17"/>
+    <p:sldId id="271" r:id="rId11"/>
+    <p:sldId id="259" r:id="rId12"/>
+    <p:sldId id="267" r:id="rId13"/>
+    <p:sldId id="268" r:id="rId14"/>
+    <p:sldId id="270" r:id="rId15"/>
+    <p:sldId id="261" r:id="rId16"/>
+    <p:sldId id="272" r:id="rId17"/>
+    <p:sldId id="257" r:id="rId18"/>
+    <p:sldId id="262" r:id="rId19"/>
+    <p:sldId id="269" r:id="rId20"/>
   </p:sldIdLst>
   <p:sldSz cx="12192000" cy="6858000"/>
   <p:notesSz cx="6858000" cy="9144000"/>
@@ -10188,8 +10191,8 @@
         </p:blipFill>
         <p:spPr>
           <a:xfrm>
-            <a:off x="609600" y="1989337"/>
-            <a:ext cx="10972800" cy="3747688"/>
+            <a:off x="3404205" y="1359872"/>
+            <a:ext cx="6049284" cy="5085610"/>
           </a:xfrm>
           <a:prstGeom prst="rect">
             <a:avLst/>
@@ -10199,7 +10202,7 @@
     </p:spTree>
     <p:extLst>
       <p:ext uri="{BB962C8B-B14F-4D97-AF65-F5344CB8AC3E}">
-        <p14:creationId xmlns:p14="http://schemas.microsoft.com/office/powerpoint/2010/main" val="390854667"/>
+        <p14:creationId xmlns:p14="http://schemas.microsoft.com/office/powerpoint/2010/main" val="3057113510"/>
       </p:ext>
     </p:extLst>
   </p:cSld>
@@ -10243,6 +10246,668 @@
           <a:p>
             <a:r>
               <a:rPr lang="es-CL" dirty="0" smtClean="0"/>
+              <a:t>Sensor DHT11</a:t>
+            </a:r>
+            <a:endParaRPr lang="es-ES" dirty="0"/>
+          </a:p>
+        </p:txBody>
+      </p:sp>
+      <p:pic>
+        <p:nvPicPr>
+          <p:cNvPr id="4" name="Marcador de contenido 3"/>
+          <p:cNvPicPr>
+            <a:picLocks noGrp="1" noChangeAspect="1"/>
+          </p:cNvPicPr>
+          <p:nvPr>
+            <p:ph idx="1"/>
+          </p:nvPr>
+        </p:nvPicPr>
+        <p:blipFill>
+          <a:blip r:embed="rId2"/>
+          <a:stretch>
+            <a:fillRect/>
+          </a:stretch>
+        </p:blipFill>
+        <p:spPr>
+          <a:xfrm>
+            <a:off x="609600" y="1989337"/>
+            <a:ext cx="10972800" cy="3747688"/>
+          </a:xfrm>
+          <a:prstGeom prst="rect">
+            <a:avLst/>
+          </a:prstGeom>
+        </p:spPr>
+      </p:pic>
+    </p:spTree>
+    <p:extLst>
+      <p:ext uri="{BB962C8B-B14F-4D97-AF65-F5344CB8AC3E}">
+        <p14:creationId xmlns:p14="http://schemas.microsoft.com/office/powerpoint/2010/main" val="390854667"/>
+      </p:ext>
+    </p:extLst>
+  </p:cSld>
+  <p:clrMapOvr>
+    <a:masterClrMapping/>
+  </p:clrMapOvr>
+</p:sld>
+</file>
+
+<file path=ppt/slides/slide12.xml><?xml version="1.0" encoding="utf-8"?>
+<p:sld xmlns:a="http://schemas.openxmlformats.org/drawingml/2006/main" xmlns:r="http://schemas.openxmlformats.org/officeDocument/2006/relationships" xmlns:p="http://schemas.openxmlformats.org/presentationml/2006/main">
+  <p:cSld>
+    <p:spTree>
+      <p:nvGrpSpPr>
+        <p:cNvPr id="1" name=""/>
+        <p:cNvGrpSpPr/>
+        <p:nvPr/>
+      </p:nvGrpSpPr>
+      <p:grpSpPr>
+        <a:xfrm>
+          <a:off x="0" y="0"/>
+          <a:ext cx="0" cy="0"/>
+          <a:chOff x="0" y="0"/>
+          <a:chExt cx="0" cy="0"/>
+        </a:xfrm>
+      </p:grpSpPr>
+      <p:sp>
+        <p:nvSpPr>
+          <p:cNvPr id="2" name="Título 1"/>
+          <p:cNvSpPr>
+            <a:spLocks noGrp="1"/>
+          </p:cNvSpPr>
+          <p:nvPr>
+            <p:ph type="title"/>
+          </p:nvPr>
+        </p:nvSpPr>
+        <p:spPr/>
+        <p:txBody>
+          <a:bodyPr/>
+          <a:lstStyle/>
+          <a:p>
+            <a:r>
+              <a:rPr lang="es-CL" dirty="0" smtClean="0"/>
+              <a:t>Sensor DHT11-</a:t>
+            </a:r>
+            <a:endParaRPr lang="es-ES" dirty="0"/>
+          </a:p>
+        </p:txBody>
+      </p:sp>
+      <p:sp>
+        <p:nvSpPr>
+          <p:cNvPr id="3" name="Marcador de contenido 2"/>
+          <p:cNvSpPr>
+            <a:spLocks noGrp="1"/>
+          </p:cNvSpPr>
+          <p:nvPr>
+            <p:ph idx="1"/>
+          </p:nvPr>
+        </p:nvSpPr>
+        <p:spPr>
+          <a:xfrm>
+            <a:off x="609600" y="1600201"/>
+            <a:ext cx="3445042" cy="4525963"/>
+          </a:xfrm>
+        </p:spPr>
+        <p:txBody>
+          <a:bodyPr>
+            <a:noAutofit/>
+          </a:bodyPr>
+          <a:lstStyle/>
+          <a:p>
+            <a:pPr marL="0" indent="0">
+              <a:buNone/>
+            </a:pPr>
+            <a:r>
+              <a:rPr lang="es-ES" sz="1800" dirty="0" smtClean="0"/>
+              <a:t>#</a:t>
+            </a:r>
+            <a:r>
+              <a:rPr lang="es-ES" sz="1800" dirty="0" err="1"/>
+              <a:t>include</a:t>
+            </a:r>
+            <a:r>
+              <a:rPr lang="es-ES" sz="1800" dirty="0"/>
+              <a:t> "</a:t>
+            </a:r>
+            <a:r>
+              <a:rPr lang="es-ES" sz="1800" dirty="0" err="1"/>
+              <a:t>DHT.h</a:t>
+            </a:r>
+            <a:r>
+              <a:rPr lang="es-ES" sz="1800" dirty="0"/>
+              <a:t>"</a:t>
+            </a:r>
+          </a:p>
+          <a:p>
+            <a:pPr marL="0" indent="0">
+              <a:buNone/>
+            </a:pPr>
+            <a:endParaRPr lang="es-ES" sz="1800" dirty="0"/>
+          </a:p>
+          <a:p>
+            <a:pPr marL="0" indent="0">
+              <a:buNone/>
+            </a:pPr>
+            <a:r>
+              <a:rPr lang="es-ES" sz="1800" dirty="0"/>
+              <a:t>#define DHTPIN 2     </a:t>
+            </a:r>
+          </a:p>
+          <a:p>
+            <a:pPr marL="0" indent="0">
+              <a:buNone/>
+            </a:pPr>
+            <a:r>
+              <a:rPr lang="es-ES" sz="1800" dirty="0"/>
+              <a:t>#define DHTTYPE DHT11   </a:t>
+            </a:r>
+          </a:p>
+          <a:p>
+            <a:pPr marL="0" indent="0">
+              <a:buNone/>
+            </a:pPr>
+            <a:endParaRPr lang="es-ES" sz="1800" dirty="0"/>
+          </a:p>
+          <a:p>
+            <a:pPr marL="0" indent="0">
+              <a:buNone/>
+            </a:pPr>
+            <a:r>
+              <a:rPr lang="es-ES" sz="1800" dirty="0"/>
+              <a:t>DHT </a:t>
+            </a:r>
+            <a:r>
+              <a:rPr lang="es-ES" sz="1800" dirty="0" err="1"/>
+              <a:t>dht</a:t>
+            </a:r>
+            <a:r>
+              <a:rPr lang="es-ES" sz="1800" dirty="0"/>
+              <a:t>(DHTPIN, DHTTYPE);</a:t>
+            </a:r>
+          </a:p>
+          <a:p>
+            <a:pPr marL="0" indent="0">
+              <a:buNone/>
+            </a:pPr>
+            <a:endParaRPr lang="es-ES" sz="1800" dirty="0"/>
+          </a:p>
+          <a:p>
+            <a:pPr marL="0" indent="0">
+              <a:buNone/>
+            </a:pPr>
+            <a:r>
+              <a:rPr lang="es-ES" sz="1800" dirty="0" err="1"/>
+              <a:t>void</a:t>
+            </a:r>
+            <a:r>
+              <a:rPr lang="es-ES" sz="1800" dirty="0"/>
+              <a:t> </a:t>
+            </a:r>
+            <a:r>
+              <a:rPr lang="es-ES" sz="1800" dirty="0" err="1"/>
+              <a:t>setup</a:t>
+            </a:r>
+            <a:r>
+              <a:rPr lang="es-ES" sz="1800" dirty="0"/>
+              <a:t>() {</a:t>
+            </a:r>
+          </a:p>
+          <a:p>
+            <a:pPr marL="0" indent="0">
+              <a:buNone/>
+            </a:pPr>
+            <a:r>
+              <a:rPr lang="es-ES" sz="1800" dirty="0"/>
+              <a:t>  </a:t>
+            </a:r>
+            <a:r>
+              <a:rPr lang="es-ES" sz="1800" dirty="0" err="1"/>
+              <a:t>Serial.begin</a:t>
+            </a:r>
+            <a:r>
+              <a:rPr lang="es-ES" sz="1800" dirty="0"/>
+              <a:t>(115200);</a:t>
+            </a:r>
+          </a:p>
+          <a:p>
+            <a:pPr marL="0" indent="0">
+              <a:buNone/>
+            </a:pPr>
+            <a:r>
+              <a:rPr lang="es-ES" sz="1800" dirty="0"/>
+              <a:t>  </a:t>
+            </a:r>
+            <a:r>
+              <a:rPr lang="es-ES" sz="1800" dirty="0" err="1"/>
+              <a:t>Serial.println</a:t>
+            </a:r>
+            <a:r>
+              <a:rPr lang="es-ES" sz="1800" dirty="0"/>
+              <a:t>("DHT11 test!");</a:t>
+            </a:r>
+          </a:p>
+          <a:p>
+            <a:pPr marL="0" indent="0">
+              <a:buNone/>
+            </a:pPr>
+            <a:r>
+              <a:rPr lang="es-ES" sz="1800" dirty="0" smtClean="0"/>
+              <a:t>  </a:t>
+            </a:r>
+            <a:r>
+              <a:rPr lang="es-ES" sz="1800" dirty="0" err="1"/>
+              <a:t>dht.begin</a:t>
+            </a:r>
+            <a:r>
+              <a:rPr lang="es-ES" sz="1800" dirty="0"/>
+              <a:t>();</a:t>
+            </a:r>
+          </a:p>
+          <a:p>
+            <a:pPr marL="0" indent="0">
+              <a:buNone/>
+            </a:pPr>
+            <a:r>
+              <a:rPr lang="es-ES" sz="1800" dirty="0"/>
+              <a:t>}</a:t>
+            </a:r>
+          </a:p>
+          <a:p>
+            <a:pPr marL="0" indent="0">
+              <a:buNone/>
+            </a:pPr>
+            <a:endParaRPr lang="es-ES" sz="1800" dirty="0"/>
+          </a:p>
+        </p:txBody>
+      </p:sp>
+      <p:sp>
+        <p:nvSpPr>
+          <p:cNvPr id="4" name="CuadroTexto 3"/>
+          <p:cNvSpPr txBox="1"/>
+          <p:nvPr/>
+        </p:nvSpPr>
+        <p:spPr>
+          <a:xfrm>
+            <a:off x="6902116" y="1129438"/>
+            <a:ext cx="4680284" cy="5170646"/>
+          </a:xfrm>
+          <a:prstGeom prst="rect">
+            <a:avLst/>
+          </a:prstGeom>
+          <a:noFill/>
+        </p:spPr>
+        <p:txBody>
+          <a:bodyPr wrap="square" rtlCol="0">
+            <a:spAutoFit/>
+          </a:bodyPr>
+          <a:lstStyle/>
+          <a:p>
+            <a:r>
+              <a:rPr lang="es-ES" sz="1600" dirty="0" err="1"/>
+              <a:t>void</a:t>
+            </a:r>
+            <a:r>
+              <a:rPr lang="es-ES" sz="1600" dirty="0"/>
+              <a:t> </a:t>
+            </a:r>
+            <a:r>
+              <a:rPr lang="es-ES" sz="1600" dirty="0" err="1"/>
+              <a:t>loop</a:t>
+            </a:r>
+            <a:r>
+              <a:rPr lang="es-ES" sz="1600" dirty="0"/>
+              <a:t>() {</a:t>
+            </a:r>
+          </a:p>
+          <a:p>
+            <a:r>
+              <a:rPr lang="es-ES" sz="1600" dirty="0"/>
+              <a:t>  </a:t>
+            </a:r>
+            <a:r>
+              <a:rPr lang="es-ES" sz="1600" dirty="0" err="1"/>
+              <a:t>delay</a:t>
+            </a:r>
+            <a:r>
+              <a:rPr lang="es-ES" sz="1600" dirty="0"/>
+              <a:t>(2000);</a:t>
+            </a:r>
+          </a:p>
+          <a:p>
+            <a:r>
+              <a:rPr lang="es-ES" sz="1600" dirty="0"/>
+              <a:t>  </a:t>
+            </a:r>
+            <a:r>
+              <a:rPr lang="es-ES" sz="1600" dirty="0" err="1"/>
+              <a:t>float</a:t>
+            </a:r>
+            <a:r>
+              <a:rPr lang="es-ES" sz="1600" dirty="0"/>
+              <a:t> h = </a:t>
+            </a:r>
+            <a:r>
+              <a:rPr lang="es-ES" sz="1600" dirty="0" err="1"/>
+              <a:t>dht.readHumidity</a:t>
+            </a:r>
+            <a:r>
+              <a:rPr lang="es-ES" sz="1600" dirty="0"/>
+              <a:t>();</a:t>
+            </a:r>
+          </a:p>
+          <a:p>
+            <a:r>
+              <a:rPr lang="es-ES" sz="1600" dirty="0"/>
+              <a:t>  </a:t>
+            </a:r>
+            <a:r>
+              <a:rPr lang="es-ES" sz="1600" dirty="0" err="1"/>
+              <a:t>float</a:t>
+            </a:r>
+            <a:r>
+              <a:rPr lang="es-ES" sz="1600" dirty="0"/>
+              <a:t> t = </a:t>
+            </a:r>
+            <a:r>
+              <a:rPr lang="es-ES" sz="1600" dirty="0" err="1"/>
+              <a:t>dht.readTemperature</a:t>
+            </a:r>
+            <a:r>
+              <a:rPr lang="es-ES" sz="1600" dirty="0"/>
+              <a:t>();</a:t>
+            </a:r>
+          </a:p>
+          <a:p>
+            <a:r>
+              <a:rPr lang="es-ES" sz="1600" dirty="0"/>
+              <a:t>  </a:t>
+            </a:r>
+            <a:r>
+              <a:rPr lang="es-ES" sz="1600" dirty="0" err="1"/>
+              <a:t>float</a:t>
+            </a:r>
+            <a:r>
+              <a:rPr lang="es-ES" sz="1600" dirty="0"/>
+              <a:t> f = </a:t>
+            </a:r>
+            <a:r>
+              <a:rPr lang="es-ES" sz="1600" dirty="0" err="1"/>
+              <a:t>dht.readTemperature</a:t>
+            </a:r>
+            <a:r>
+              <a:rPr lang="es-ES" sz="1600" dirty="0"/>
+              <a:t>(true);</a:t>
+            </a:r>
+          </a:p>
+          <a:p>
+            <a:endParaRPr lang="es-ES" sz="1600" dirty="0"/>
+          </a:p>
+          <a:p>
+            <a:r>
+              <a:rPr lang="es-ES" sz="1600" dirty="0"/>
+              <a:t>  </a:t>
+            </a:r>
+            <a:r>
+              <a:rPr lang="es-ES" sz="1600" dirty="0" err="1"/>
+              <a:t>if</a:t>
+            </a:r>
+            <a:r>
+              <a:rPr lang="es-ES" sz="1600" dirty="0"/>
+              <a:t> (</a:t>
+            </a:r>
+            <a:r>
+              <a:rPr lang="es-ES" sz="1600" dirty="0" err="1"/>
+              <a:t>isnan</a:t>
+            </a:r>
+            <a:r>
+              <a:rPr lang="es-ES" sz="1600" dirty="0"/>
+              <a:t>(h) || </a:t>
+            </a:r>
+            <a:r>
+              <a:rPr lang="es-ES" sz="1600" dirty="0" err="1"/>
+              <a:t>isnan</a:t>
+            </a:r>
+            <a:r>
+              <a:rPr lang="es-ES" sz="1600" dirty="0"/>
+              <a:t>(t) || </a:t>
+            </a:r>
+            <a:r>
+              <a:rPr lang="es-ES" sz="1600" dirty="0" err="1"/>
+              <a:t>isnan</a:t>
+            </a:r>
+            <a:r>
+              <a:rPr lang="es-ES" sz="1600" dirty="0"/>
+              <a:t>(f)) {</a:t>
+            </a:r>
+          </a:p>
+          <a:p>
+            <a:r>
+              <a:rPr lang="es-ES" sz="1600" dirty="0"/>
+              <a:t>    </a:t>
+            </a:r>
+            <a:r>
+              <a:rPr lang="es-ES" sz="1600" dirty="0" err="1"/>
+              <a:t>Serial.println</a:t>
+            </a:r>
+            <a:r>
+              <a:rPr lang="es-ES" sz="1600" dirty="0"/>
+              <a:t>("</a:t>
+            </a:r>
+            <a:r>
+              <a:rPr lang="es-ES" sz="1600" dirty="0" err="1"/>
+              <a:t>Failed</a:t>
+            </a:r>
+            <a:r>
+              <a:rPr lang="es-ES" sz="1600" dirty="0"/>
+              <a:t> to </a:t>
+            </a:r>
+            <a:r>
+              <a:rPr lang="es-ES" sz="1600" dirty="0" err="1"/>
+              <a:t>read</a:t>
+            </a:r>
+            <a:r>
+              <a:rPr lang="es-ES" sz="1600" dirty="0"/>
+              <a:t> </a:t>
+            </a:r>
+            <a:r>
+              <a:rPr lang="es-ES" sz="1600" dirty="0" err="1"/>
+              <a:t>from</a:t>
+            </a:r>
+            <a:r>
+              <a:rPr lang="es-ES" sz="1600" dirty="0"/>
+              <a:t> DHT sensor!");</a:t>
+            </a:r>
+          </a:p>
+          <a:p>
+            <a:r>
+              <a:rPr lang="es-ES" sz="1600" dirty="0"/>
+              <a:t>    </a:t>
+            </a:r>
+            <a:r>
+              <a:rPr lang="es-ES" sz="1600" dirty="0" err="1"/>
+              <a:t>return</a:t>
+            </a:r>
+            <a:r>
+              <a:rPr lang="es-ES" sz="1600" dirty="0"/>
+              <a:t>;</a:t>
+            </a:r>
+          </a:p>
+          <a:p>
+            <a:r>
+              <a:rPr lang="es-ES" sz="1600" dirty="0"/>
+              <a:t>  }</a:t>
+            </a:r>
+          </a:p>
+          <a:p>
+            <a:endParaRPr lang="es-ES" sz="1600" dirty="0"/>
+          </a:p>
+          <a:p>
+            <a:r>
+              <a:rPr lang="es-ES" sz="1600" dirty="0"/>
+              <a:t>  </a:t>
+            </a:r>
+            <a:r>
+              <a:rPr lang="es-ES" sz="1600" dirty="0" err="1"/>
+              <a:t>Serial.print</a:t>
+            </a:r>
+            <a:r>
+              <a:rPr lang="es-ES" sz="1600" dirty="0"/>
+              <a:t>("Humedad: ");</a:t>
+            </a:r>
+          </a:p>
+          <a:p>
+            <a:r>
+              <a:rPr lang="es-ES" sz="1600" dirty="0"/>
+              <a:t>  </a:t>
+            </a:r>
+            <a:r>
+              <a:rPr lang="es-ES" sz="1600" dirty="0" err="1"/>
+              <a:t>Serial.print</a:t>
+            </a:r>
+            <a:r>
+              <a:rPr lang="es-ES" sz="1600" dirty="0"/>
+              <a:t>(h);</a:t>
+            </a:r>
+          </a:p>
+          <a:p>
+            <a:r>
+              <a:rPr lang="es-ES" sz="1600" dirty="0"/>
+              <a:t>  </a:t>
+            </a:r>
+            <a:r>
+              <a:rPr lang="es-ES" sz="1600" dirty="0" err="1"/>
+              <a:t>Serial.print</a:t>
+            </a:r>
+            <a:r>
+              <a:rPr lang="es-ES" sz="1600" dirty="0"/>
+              <a:t>(" %\t");</a:t>
+            </a:r>
+          </a:p>
+          <a:p>
+            <a:r>
+              <a:rPr lang="es-ES" sz="1600" dirty="0"/>
+              <a:t>  </a:t>
+            </a:r>
+            <a:r>
+              <a:rPr lang="es-ES" sz="1600" dirty="0" err="1"/>
+              <a:t>Serial.print</a:t>
+            </a:r>
+            <a:r>
+              <a:rPr lang="es-ES" sz="1600" dirty="0"/>
+              <a:t>("Temperatura: ");</a:t>
+            </a:r>
+          </a:p>
+          <a:p>
+            <a:r>
+              <a:rPr lang="es-ES" sz="1600" dirty="0"/>
+              <a:t>  </a:t>
+            </a:r>
+            <a:r>
+              <a:rPr lang="es-ES" sz="1600" dirty="0" err="1"/>
+              <a:t>Serial.print</a:t>
+            </a:r>
+            <a:r>
+              <a:rPr lang="es-ES" sz="1600" dirty="0"/>
+              <a:t>(t);</a:t>
+            </a:r>
+          </a:p>
+          <a:p>
+            <a:r>
+              <a:rPr lang="es-ES" sz="1600" dirty="0"/>
+              <a:t>  </a:t>
+            </a:r>
+            <a:r>
+              <a:rPr lang="es-ES" sz="1600" dirty="0" err="1"/>
+              <a:t>Serial.print</a:t>
+            </a:r>
+            <a:r>
+              <a:rPr lang="es-ES" sz="1600" dirty="0"/>
+              <a:t>(" *C ");</a:t>
+            </a:r>
+          </a:p>
+          <a:p>
+            <a:r>
+              <a:rPr lang="es-ES" sz="1600" dirty="0"/>
+              <a:t>  </a:t>
+            </a:r>
+            <a:r>
+              <a:rPr lang="es-ES" sz="1600" dirty="0" err="1"/>
+              <a:t>Serial.print</a:t>
+            </a:r>
+            <a:r>
+              <a:rPr lang="es-ES" sz="1600" dirty="0"/>
+              <a:t>(f);</a:t>
+            </a:r>
+          </a:p>
+          <a:p>
+            <a:r>
+              <a:rPr lang="es-ES" sz="1600" dirty="0"/>
+              <a:t>  </a:t>
+            </a:r>
+            <a:r>
+              <a:rPr lang="es-ES" sz="1600" dirty="0" err="1"/>
+              <a:t>Serial.print</a:t>
+            </a:r>
+            <a:r>
+              <a:rPr lang="es-ES" sz="1600" dirty="0"/>
+              <a:t>(" *F\t");</a:t>
+            </a:r>
+          </a:p>
+          <a:p>
+            <a:r>
+              <a:rPr lang="es-ES" sz="1600" dirty="0"/>
+              <a:t>}</a:t>
+            </a:r>
+            <a:endParaRPr lang="es-ES" sz="1600" dirty="0"/>
+          </a:p>
+        </p:txBody>
+      </p:sp>
+    </p:spTree>
+    <p:extLst>
+      <p:ext uri="{BB962C8B-B14F-4D97-AF65-F5344CB8AC3E}">
+        <p14:creationId xmlns:p14="http://schemas.microsoft.com/office/powerpoint/2010/main" val="1443043479"/>
+      </p:ext>
+    </p:extLst>
+  </p:cSld>
+  <p:clrMapOvr>
+    <a:masterClrMapping/>
+  </p:clrMapOvr>
+</p:sld>
+</file>
+
+<file path=ppt/slides/slide13.xml><?xml version="1.0" encoding="utf-8"?>
+<p:sld xmlns:a="http://schemas.openxmlformats.org/drawingml/2006/main" xmlns:r="http://schemas.openxmlformats.org/officeDocument/2006/relationships" xmlns:p="http://schemas.openxmlformats.org/presentationml/2006/main">
+  <p:cSld>
+    <p:spTree>
+      <p:nvGrpSpPr>
+        <p:cNvPr id="1" name=""/>
+        <p:cNvGrpSpPr/>
+        <p:nvPr/>
+      </p:nvGrpSpPr>
+      <p:grpSpPr>
+        <a:xfrm>
+          <a:off x="0" y="0"/>
+          <a:ext cx="0" cy="0"/>
+          <a:chOff x="0" y="0"/>
+          <a:chExt cx="0" cy="0"/>
+        </a:xfrm>
+      </p:grpSpPr>
+      <p:sp>
+        <p:nvSpPr>
+          <p:cNvPr id="2" name="Título 1"/>
+          <p:cNvSpPr>
+            <a:spLocks noGrp="1"/>
+          </p:cNvSpPr>
+          <p:nvPr>
+            <p:ph type="title"/>
+          </p:nvPr>
+        </p:nvSpPr>
+        <p:spPr/>
+        <p:txBody>
+          <a:bodyPr/>
+          <a:lstStyle/>
+          <a:p>
+            <a:r>
+              <a:rPr lang="es-CL" dirty="0" smtClean="0"/>
               <a:t>NRF24L01+</a:t>
             </a:r>
             <a:endParaRPr lang="es-ES" dirty="0"/>
@@ -10345,7 +11010,558 @@
 </p:sld>
 </file>
 
-<file path=ppt/slides/slide12.xml><?xml version="1.0" encoding="utf-8"?>
+<file path=ppt/slides/slide14.xml><?xml version="1.0" encoding="utf-8"?>
+<p:sld xmlns:a="http://schemas.openxmlformats.org/drawingml/2006/main" xmlns:r="http://schemas.openxmlformats.org/officeDocument/2006/relationships" xmlns:p="http://schemas.openxmlformats.org/presentationml/2006/main">
+  <p:cSld>
+    <p:spTree>
+      <p:nvGrpSpPr>
+        <p:cNvPr id="1" name=""/>
+        <p:cNvGrpSpPr/>
+        <p:nvPr/>
+      </p:nvGrpSpPr>
+      <p:grpSpPr>
+        <a:xfrm>
+          <a:off x="0" y="0"/>
+          <a:ext cx="0" cy="0"/>
+          <a:chOff x="0" y="0"/>
+          <a:chExt cx="0" cy="0"/>
+        </a:xfrm>
+      </p:grpSpPr>
+      <p:sp>
+        <p:nvSpPr>
+          <p:cNvPr id="2" name="Título 1"/>
+          <p:cNvSpPr>
+            <a:spLocks noGrp="1"/>
+          </p:cNvSpPr>
+          <p:nvPr>
+            <p:ph type="title"/>
+          </p:nvPr>
+        </p:nvSpPr>
+        <p:spPr/>
+        <p:txBody>
+          <a:bodyPr/>
+          <a:lstStyle/>
+          <a:p>
+            <a:r>
+              <a:rPr lang="es-CL" dirty="0" smtClean="0"/>
+              <a:t>NRF24L01 </a:t>
+            </a:r>
+            <a:r>
+              <a:rPr lang="es-CL" dirty="0" err="1" smtClean="0"/>
+              <a:t>codigo</a:t>
+            </a:r>
+            <a:endParaRPr lang="es-ES" dirty="0"/>
+          </a:p>
+        </p:txBody>
+      </p:sp>
+      <p:sp>
+        <p:nvSpPr>
+          <p:cNvPr id="3" name="Marcador de contenido 2"/>
+          <p:cNvSpPr>
+            <a:spLocks noGrp="1"/>
+          </p:cNvSpPr>
+          <p:nvPr>
+            <p:ph idx="1"/>
+          </p:nvPr>
+        </p:nvSpPr>
+        <p:spPr>
+          <a:xfrm>
+            <a:off x="609600" y="1383160"/>
+            <a:ext cx="6118746" cy="4525963"/>
+          </a:xfrm>
+        </p:spPr>
+        <p:txBody>
+          <a:bodyPr>
+            <a:noAutofit/>
+          </a:bodyPr>
+          <a:lstStyle/>
+          <a:p>
+            <a:pPr marL="0" indent="0">
+              <a:buNone/>
+            </a:pPr>
+            <a:r>
+              <a:rPr lang="es-ES" sz="1600" dirty="0"/>
+              <a:t>#</a:t>
+            </a:r>
+            <a:r>
+              <a:rPr lang="es-ES" sz="1600" dirty="0" err="1"/>
+              <a:t>include</a:t>
+            </a:r>
+            <a:r>
+              <a:rPr lang="es-ES" sz="1600" dirty="0"/>
+              <a:t> &lt;</a:t>
+            </a:r>
+            <a:r>
+              <a:rPr lang="es-ES" sz="1600" dirty="0" err="1"/>
+              <a:t>SPI.h</a:t>
+            </a:r>
+            <a:r>
+              <a:rPr lang="es-ES" sz="1600" dirty="0"/>
+              <a:t>&gt;</a:t>
+            </a:r>
+          </a:p>
+          <a:p>
+            <a:pPr marL="0" indent="0">
+              <a:buNone/>
+            </a:pPr>
+            <a:r>
+              <a:rPr lang="es-ES" sz="1600" dirty="0"/>
+              <a:t>#</a:t>
+            </a:r>
+            <a:r>
+              <a:rPr lang="es-ES" sz="1600" dirty="0" err="1"/>
+              <a:t>include</a:t>
+            </a:r>
+            <a:r>
+              <a:rPr lang="es-ES" sz="1600" dirty="0"/>
+              <a:t> "nRF24L01.h"</a:t>
+            </a:r>
+          </a:p>
+          <a:p>
+            <a:pPr marL="0" indent="0">
+              <a:buNone/>
+            </a:pPr>
+            <a:r>
+              <a:rPr lang="es-ES" sz="1600" dirty="0"/>
+              <a:t>#</a:t>
+            </a:r>
+            <a:r>
+              <a:rPr lang="es-ES" sz="1600" dirty="0" err="1"/>
+              <a:t>include</a:t>
+            </a:r>
+            <a:r>
+              <a:rPr lang="es-ES" sz="1600" dirty="0"/>
+              <a:t> "RF24.h"</a:t>
+            </a:r>
+          </a:p>
+          <a:p>
+            <a:pPr marL="0" indent="0">
+              <a:buNone/>
+            </a:pPr>
+            <a:r>
+              <a:rPr lang="es-ES" sz="1600" dirty="0"/>
+              <a:t>RF24 radio(9,10);</a:t>
+            </a:r>
+          </a:p>
+          <a:p>
+            <a:pPr marL="0" indent="0">
+              <a:buNone/>
+            </a:pPr>
+            <a:r>
+              <a:rPr lang="es-ES" sz="1600" dirty="0"/>
+              <a:t>byte </a:t>
+            </a:r>
+            <a:r>
+              <a:rPr lang="es-ES" sz="1600" dirty="0" err="1"/>
+              <a:t>addrs</a:t>
+            </a:r>
+            <a:r>
+              <a:rPr lang="es-ES" sz="1600" dirty="0"/>
+              <a:t>[][6]={{0xe8,0xe8,0xf0,0xf0,0xe1},{0xf0,0xf0,0xf0,0xf0,0xe1}};</a:t>
+            </a:r>
+          </a:p>
+          <a:p>
+            <a:pPr marL="0" indent="0">
+              <a:buNone/>
+            </a:pPr>
+            <a:endParaRPr lang="es-ES" sz="1600" dirty="0"/>
+          </a:p>
+          <a:p>
+            <a:pPr marL="0" indent="0">
+              <a:buNone/>
+            </a:pPr>
+            <a:r>
+              <a:rPr lang="es-ES" sz="1600" dirty="0" err="1"/>
+              <a:t>void</a:t>
+            </a:r>
+            <a:r>
+              <a:rPr lang="es-ES" sz="1600" dirty="0"/>
+              <a:t> </a:t>
+            </a:r>
+            <a:r>
+              <a:rPr lang="es-ES" sz="1600" dirty="0" err="1"/>
+              <a:t>setup</a:t>
+            </a:r>
+            <a:r>
+              <a:rPr lang="es-ES" sz="1600" dirty="0"/>
+              <a:t>() {</a:t>
+            </a:r>
+          </a:p>
+          <a:p>
+            <a:pPr marL="0" indent="0">
+              <a:buNone/>
+            </a:pPr>
+            <a:r>
+              <a:rPr lang="es-ES" sz="1600" dirty="0"/>
+              <a:t>  </a:t>
+            </a:r>
+            <a:r>
+              <a:rPr lang="es-ES" sz="1600" dirty="0" err="1"/>
+              <a:t>Serial.begin</a:t>
+            </a:r>
+            <a:r>
+              <a:rPr lang="es-ES" sz="1600" dirty="0"/>
+              <a:t>(115200);</a:t>
+            </a:r>
+          </a:p>
+          <a:p>
+            <a:pPr marL="0" indent="0">
+              <a:buNone/>
+            </a:pPr>
+            <a:r>
+              <a:rPr lang="es-ES" sz="1600" dirty="0"/>
+              <a:t>  </a:t>
+            </a:r>
+            <a:r>
+              <a:rPr lang="es-ES" sz="1600" dirty="0" err="1"/>
+              <a:t>radio.begin</a:t>
+            </a:r>
+            <a:r>
+              <a:rPr lang="es-ES" sz="1600" dirty="0"/>
+              <a:t>();</a:t>
+            </a:r>
+          </a:p>
+          <a:p>
+            <a:pPr marL="0" indent="0">
+              <a:buNone/>
+            </a:pPr>
+            <a:r>
+              <a:rPr lang="es-ES" sz="1600" dirty="0"/>
+              <a:t>  </a:t>
+            </a:r>
+            <a:r>
+              <a:rPr lang="es-ES" sz="1600" dirty="0" err="1"/>
+              <a:t>radio.setChannel</a:t>
+            </a:r>
+            <a:r>
+              <a:rPr lang="es-ES" sz="1600" dirty="0"/>
+              <a:t>(0x76);</a:t>
+            </a:r>
+          </a:p>
+          <a:p>
+            <a:pPr marL="0" indent="0">
+              <a:buNone/>
+            </a:pPr>
+            <a:r>
+              <a:rPr lang="es-ES" sz="1600" dirty="0"/>
+              <a:t>  </a:t>
+            </a:r>
+            <a:r>
+              <a:rPr lang="es-ES" sz="1600" dirty="0" err="1"/>
+              <a:t>radio.setPALevel</a:t>
+            </a:r>
+            <a:r>
+              <a:rPr lang="es-ES" sz="1600" dirty="0"/>
+              <a:t>(RF24_PA_LOW);</a:t>
+            </a:r>
+          </a:p>
+          <a:p>
+            <a:pPr marL="0" indent="0">
+              <a:buNone/>
+            </a:pPr>
+            <a:r>
+              <a:rPr lang="es-ES" sz="1600" dirty="0"/>
+              <a:t>  </a:t>
+            </a:r>
+            <a:r>
+              <a:rPr lang="es-ES" sz="1600" dirty="0" err="1"/>
+              <a:t>radio.openWritingPipe</a:t>
+            </a:r>
+            <a:r>
+              <a:rPr lang="es-ES" sz="1600" dirty="0"/>
+              <a:t>(0xF0F0F0F0E1LL);</a:t>
+            </a:r>
+          </a:p>
+          <a:p>
+            <a:pPr marL="0" indent="0">
+              <a:buNone/>
+            </a:pPr>
+            <a:r>
+              <a:rPr lang="es-ES" sz="1600" dirty="0"/>
+              <a:t>  </a:t>
+            </a:r>
+            <a:r>
+              <a:rPr lang="es-ES" sz="1600" dirty="0" err="1"/>
+              <a:t>radio.openReadingPipe</a:t>
+            </a:r>
+            <a:r>
+              <a:rPr lang="es-ES" sz="1600" dirty="0"/>
+              <a:t>(1,0xE8E8F0F0E1LL);</a:t>
+            </a:r>
+          </a:p>
+          <a:p>
+            <a:pPr marL="0" indent="0">
+              <a:buNone/>
+            </a:pPr>
+            <a:r>
+              <a:rPr lang="es-ES" sz="1600" dirty="0"/>
+              <a:t>  </a:t>
+            </a:r>
+            <a:r>
+              <a:rPr lang="es-ES" sz="1600" dirty="0" err="1"/>
+              <a:t>radio.enableDynamicPayloads</a:t>
+            </a:r>
+            <a:r>
+              <a:rPr lang="es-ES" sz="1600" dirty="0"/>
+              <a:t>();</a:t>
+            </a:r>
+          </a:p>
+          <a:p>
+            <a:pPr marL="0" indent="0">
+              <a:buNone/>
+            </a:pPr>
+            <a:r>
+              <a:rPr lang="es-ES" sz="1600" dirty="0"/>
+              <a:t>  </a:t>
+            </a:r>
+            <a:r>
+              <a:rPr lang="es-ES" sz="1600" dirty="0" err="1"/>
+              <a:t>radio.powerUp</a:t>
+            </a:r>
+            <a:r>
+              <a:rPr lang="es-ES" sz="1600" dirty="0"/>
+              <a:t>();</a:t>
+            </a:r>
+          </a:p>
+          <a:p>
+            <a:pPr marL="0" indent="0">
+              <a:buNone/>
+            </a:pPr>
+            <a:r>
+              <a:rPr lang="es-ES" sz="1600" dirty="0"/>
+              <a:t>  </a:t>
+            </a:r>
+            <a:r>
+              <a:rPr lang="es-ES" sz="1600" dirty="0" err="1"/>
+              <a:t>radio.startListening</a:t>
+            </a:r>
+            <a:r>
+              <a:rPr lang="es-ES" sz="1600" dirty="0"/>
+              <a:t>();</a:t>
+            </a:r>
+          </a:p>
+          <a:p>
+            <a:pPr marL="0" indent="0">
+              <a:buNone/>
+            </a:pPr>
+            <a:r>
+              <a:rPr lang="es-ES" sz="1600" dirty="0"/>
+              <a:t>}</a:t>
+            </a:r>
+          </a:p>
+          <a:p>
+            <a:pPr marL="0" indent="0">
+              <a:buNone/>
+            </a:pPr>
+            <a:endParaRPr lang="es-ES" sz="1600" dirty="0"/>
+          </a:p>
+        </p:txBody>
+      </p:sp>
+      <p:sp>
+        <p:nvSpPr>
+          <p:cNvPr id="5" name="CuadroTexto 4"/>
+          <p:cNvSpPr txBox="1"/>
+          <p:nvPr/>
+        </p:nvSpPr>
+        <p:spPr>
+          <a:xfrm>
+            <a:off x="7315200" y="1937982"/>
+            <a:ext cx="4640239" cy="3693319"/>
+          </a:xfrm>
+          <a:prstGeom prst="rect">
+            <a:avLst/>
+          </a:prstGeom>
+          <a:noFill/>
+        </p:spPr>
+        <p:txBody>
+          <a:bodyPr wrap="square" rtlCol="0">
+            <a:spAutoFit/>
+          </a:bodyPr>
+          <a:lstStyle/>
+          <a:p>
+            <a:r>
+              <a:rPr lang="es-ES" dirty="0" err="1"/>
+              <a:t>void</a:t>
+            </a:r>
+            <a:r>
+              <a:rPr lang="es-ES" dirty="0"/>
+              <a:t> </a:t>
+            </a:r>
+            <a:r>
+              <a:rPr lang="es-ES" dirty="0" err="1"/>
+              <a:t>loop</a:t>
+            </a:r>
+            <a:r>
+              <a:rPr lang="es-ES" dirty="0"/>
+              <a:t>() {</a:t>
+            </a:r>
+          </a:p>
+          <a:p>
+            <a:r>
+              <a:rPr lang="es-ES" dirty="0"/>
+              <a:t>  </a:t>
+            </a:r>
+            <a:r>
+              <a:rPr lang="es-ES" dirty="0" err="1"/>
+              <a:t>char</a:t>
+            </a:r>
+            <a:r>
+              <a:rPr lang="es-ES" dirty="0"/>
+              <a:t>  </a:t>
+            </a:r>
+            <a:r>
+              <a:rPr lang="es-ES" dirty="0" err="1"/>
+              <a:t>Buff_rx</a:t>
+            </a:r>
+            <a:r>
+              <a:rPr lang="es-ES" dirty="0"/>
+              <a:t>[32]; </a:t>
+            </a:r>
+          </a:p>
+          <a:p>
+            <a:r>
+              <a:rPr lang="es-ES" dirty="0"/>
+              <a:t>  </a:t>
+            </a:r>
+            <a:r>
+              <a:rPr lang="es-ES" dirty="0" err="1"/>
+              <a:t>char</a:t>
+            </a:r>
+            <a:r>
+              <a:rPr lang="es-ES" dirty="0"/>
+              <a:t>  </a:t>
+            </a:r>
+            <a:r>
+              <a:rPr lang="es-ES" dirty="0" err="1"/>
+              <a:t>Buff_tx</a:t>
+            </a:r>
+            <a:r>
+              <a:rPr lang="es-ES" dirty="0"/>
+              <a:t>[32];</a:t>
+            </a:r>
+          </a:p>
+          <a:p>
+            <a:r>
+              <a:rPr lang="es-ES" dirty="0"/>
+              <a:t>  </a:t>
+            </a:r>
+            <a:r>
+              <a:rPr lang="es-ES" dirty="0" err="1"/>
+              <a:t>radio.stopListening</a:t>
+            </a:r>
+            <a:r>
+              <a:rPr lang="es-ES" dirty="0"/>
+              <a:t>();</a:t>
+            </a:r>
+          </a:p>
+          <a:p>
+            <a:r>
+              <a:rPr lang="es-ES" dirty="0"/>
+              <a:t>  </a:t>
+            </a:r>
+            <a:r>
+              <a:rPr lang="es-ES" dirty="0" err="1"/>
+              <a:t>radio.write</a:t>
+            </a:r>
+            <a:r>
+              <a:rPr lang="es-ES" dirty="0"/>
+              <a:t>(Buff_tx,32);</a:t>
+            </a:r>
+          </a:p>
+          <a:p>
+            <a:r>
+              <a:rPr lang="es-ES" dirty="0"/>
+              <a:t>  </a:t>
+            </a:r>
+            <a:r>
+              <a:rPr lang="es-ES" dirty="0" err="1"/>
+              <a:t>radio.startListening</a:t>
+            </a:r>
+            <a:r>
+              <a:rPr lang="es-ES" dirty="0"/>
+              <a:t>();</a:t>
+            </a:r>
+          </a:p>
+          <a:p>
+            <a:r>
+              <a:rPr lang="es-ES" dirty="0"/>
+              <a:t>  </a:t>
+            </a:r>
+          </a:p>
+          <a:p>
+            <a:r>
+              <a:rPr lang="es-ES" dirty="0"/>
+              <a:t>  </a:t>
+            </a:r>
+            <a:r>
+              <a:rPr lang="es-ES" dirty="0" err="1"/>
+              <a:t>if</a:t>
+            </a:r>
+            <a:r>
+              <a:rPr lang="es-ES" dirty="0"/>
+              <a:t>(</a:t>
+            </a:r>
+            <a:r>
+              <a:rPr lang="es-ES" dirty="0" err="1"/>
+              <a:t>radio.available</a:t>
+            </a:r>
+            <a:r>
+              <a:rPr lang="es-ES" dirty="0"/>
+              <a:t>()){</a:t>
+            </a:r>
+          </a:p>
+          <a:p>
+            <a:r>
+              <a:rPr lang="es-ES" dirty="0"/>
+              <a:t>    </a:t>
+            </a:r>
+            <a:r>
+              <a:rPr lang="es-ES" dirty="0" err="1"/>
+              <a:t>radio.read</a:t>
+            </a:r>
+            <a:r>
+              <a:rPr lang="es-ES" dirty="0"/>
+              <a:t>(Buff_rx,32);</a:t>
+            </a:r>
+          </a:p>
+          <a:p>
+            <a:r>
+              <a:rPr lang="es-ES" dirty="0"/>
+              <a:t>  </a:t>
+            </a:r>
+            <a:r>
+              <a:rPr lang="es-ES" dirty="0" smtClean="0"/>
+              <a:t>}</a:t>
+            </a:r>
+          </a:p>
+          <a:p>
+            <a:endParaRPr lang="es-ES" dirty="0"/>
+          </a:p>
+          <a:p>
+            <a:r>
+              <a:rPr lang="es-ES" dirty="0"/>
+              <a:t>}</a:t>
+            </a:r>
+          </a:p>
+          <a:p>
+            <a:endParaRPr lang="es-ES" dirty="0"/>
+          </a:p>
+        </p:txBody>
+      </p:sp>
+    </p:spTree>
+    <p:extLst>
+      <p:ext uri="{BB962C8B-B14F-4D97-AF65-F5344CB8AC3E}">
+        <p14:creationId xmlns:p14="http://schemas.microsoft.com/office/powerpoint/2010/main" val="2789944265"/>
+      </p:ext>
+    </p:extLst>
+  </p:cSld>
+  <p:clrMapOvr>
+    <a:masterClrMapping/>
+  </p:clrMapOvr>
+</p:sld>
+</file>
+
+<file path=ppt/slides/slide15.xml><?xml version="1.0" encoding="utf-8"?>
 <p:sld xmlns:a="http://schemas.openxmlformats.org/drawingml/2006/main" xmlns:r="http://schemas.openxmlformats.org/officeDocument/2006/relationships" xmlns:p="http://schemas.openxmlformats.org/presentationml/2006/main">
   <p:cSld>
     <p:spTree>
@@ -10428,7 +11644,7 @@
 </p:sld>
 </file>
 
-<file path=ppt/slides/slide13.xml><?xml version="1.0" encoding="utf-8"?>
+<file path=ppt/slides/slide16.xml><?xml version="1.0" encoding="utf-8"?>
 <p:sld xmlns:a="http://schemas.openxmlformats.org/drawingml/2006/main" xmlns:r="http://schemas.openxmlformats.org/officeDocument/2006/relationships" xmlns:p="http://schemas.openxmlformats.org/presentationml/2006/main">
   <p:cSld>
     <p:spTree>
@@ -10511,7 +11727,7 @@
 </p:sld>
 </file>
 
-<file path=ppt/slides/slide14.xml><?xml version="1.0" encoding="utf-8"?>
+<file path=ppt/slides/slide17.xml><?xml version="1.0" encoding="utf-8"?>
 <p:sld xmlns:a="http://schemas.openxmlformats.org/drawingml/2006/main" xmlns:r="http://schemas.openxmlformats.org/officeDocument/2006/relationships" xmlns:p="http://schemas.openxmlformats.org/presentationml/2006/main">
   <p:cSld>
     <p:spTree>
@@ -11123,7 +12339,6 @@
               <a:rPr lang="es-CL" sz="2400" dirty="0" smtClean="0"/>
               <a:t> o Apagado (aunque se puede controlar su intensidad)</a:t>
             </a:r>
-            <a:endParaRPr lang="es-CL" sz="2400" dirty="0" smtClean="0"/>
           </a:p>
           <a:p>
             <a:pPr marL="285750" indent="-285750">
@@ -11188,11 +12403,7 @@
           <a:p>
             <a:r>
               <a:rPr lang="es-CL" dirty="0" smtClean="0"/>
-              <a:t>Sensor </a:t>
-            </a:r>
-            <a:r>
-              <a:rPr lang="es-CL" dirty="0" smtClean="0"/>
-              <a:t>HC-SR04</a:t>
+              <a:t>Sensor HC-SR04</a:t>
             </a:r>
             <a:endParaRPr lang="es-ES" dirty="0"/>
           </a:p>
@@ -11252,11 +12463,7 @@
             </a:pPr>
             <a:r>
               <a:rPr lang="es-CL" sz="2800" dirty="0" smtClean="0"/>
-              <a:t>Sensor </a:t>
-            </a:r>
-            <a:r>
-              <a:rPr lang="es-CL" sz="2800" dirty="0" smtClean="0"/>
-              <a:t>Ultrasónico de distancia</a:t>
+              <a:t>Sensor Ultrasónico de distancia</a:t>
             </a:r>
           </a:p>
           <a:p>
@@ -11405,103 +12612,399 @@
           <a:p>
             <a:r>
               <a:rPr lang="es-CL" dirty="0" smtClean="0"/>
-              <a:t>Sensor DHT11</a:t>
+              <a:t>HC-SR04 Ejemplo</a:t>
             </a:r>
             <a:endParaRPr lang="es-ES" dirty="0"/>
           </a:p>
         </p:txBody>
       </p:sp>
-      <p:pic>
-        <p:nvPicPr>
-          <p:cNvPr id="4" name="Marcador de contenido 3"/>
-          <p:cNvPicPr>
-            <a:picLocks noGrp="1" noChangeAspect="1"/>
-          </p:cNvPicPr>
+      <p:sp>
+        <p:nvSpPr>
+          <p:cNvPr id="3" name="Marcador de contenido 2"/>
+          <p:cNvSpPr>
+            <a:spLocks noGrp="1"/>
+          </p:cNvSpPr>
           <p:nvPr>
             <p:ph idx="1"/>
           </p:nvPr>
-        </p:nvPicPr>
-        <p:blipFill>
-          <a:blip r:embed="rId2"/>
-          <a:stretch>
-            <a:fillRect/>
-          </a:stretch>
-        </p:blipFill>
+        </p:nvSpPr>
         <p:spPr>
           <a:xfrm>
-            <a:off x="1105184" y="1417638"/>
-            <a:ext cx="4082410" cy="4082410"/>
+            <a:off x="609600" y="1417638"/>
+            <a:ext cx="10972800" cy="4525963"/>
           </a:xfrm>
-          <a:prstGeom prst="rect">
-            <a:avLst/>
-          </a:prstGeom>
         </p:spPr>
-      </p:pic>
-      <p:sp>
-        <p:nvSpPr>
-          <p:cNvPr id="5" name="CuadroTexto 4"/>
-          <p:cNvSpPr txBox="1"/>
-          <p:nvPr/>
-        </p:nvSpPr>
-        <p:spPr>
-          <a:xfrm>
-            <a:off x="5663821" y="2183642"/>
-            <a:ext cx="5650173" cy="954107"/>
-          </a:xfrm>
-          <a:prstGeom prst="rect">
-            <a:avLst/>
-          </a:prstGeom>
-          <a:noFill/>
-        </p:spPr>
-        <p:txBody>
-          <a:bodyPr wrap="square" rtlCol="0">
-            <a:spAutoFit/>
+        <p:txBody>
+          <a:bodyPr>
+            <a:noAutofit/>
           </a:bodyPr>
           <a:lstStyle/>
           <a:p>
-            <a:pPr marL="285750" indent="-285750">
-              <a:buFont typeface="Arial" panose="020B0604020202020204" pitchFamily="34" charset="0"/>
-              <a:buChar char="•"/>
+            <a:pPr marL="0" indent="0">
+              <a:buNone/>
             </a:pPr>
             <a:r>
-              <a:rPr lang="es-CL" sz="2800" dirty="0" smtClean="0"/>
-              <a:t>Temperatura (°C)</a:t>
-            </a:r>
-          </a:p>
-          <a:p>
-            <a:pPr marL="285750" indent="-285750">
-              <a:buFont typeface="Arial" panose="020B0604020202020204" pitchFamily="34" charset="0"/>
-              <a:buChar char="•"/>
+              <a:rPr lang="en-US" sz="1600" dirty="0" smtClean="0"/>
+              <a:t>#</a:t>
+            </a:r>
+            <a:r>
+              <a:rPr lang="en-US" sz="1600" dirty="0"/>
+              <a:t>include &lt;ST_HW_HC_SR04.h&gt;</a:t>
+            </a:r>
+          </a:p>
+          <a:p>
+            <a:pPr marL="0" indent="0">
+              <a:buNone/>
             </a:pPr>
             <a:r>
-              <a:rPr lang="es-CL" sz="2800" dirty="0" smtClean="0"/>
-              <a:t>Humedad ambiente (%</a:t>
-            </a:r>
-            <a:r>
-              <a:rPr lang="es-ES" sz="2800" dirty="0"/>
-              <a:t>)</a:t>
-            </a:r>
-            <a:endParaRPr lang="es-CL" sz="2800" dirty="0" smtClean="0"/>
+              <a:rPr lang="en-US" sz="1600" dirty="0" smtClean="0"/>
+              <a:t>ST_HW_HC_SR04 </a:t>
+            </a:r>
+            <a:r>
+              <a:rPr lang="en-US" sz="1600" dirty="0" err="1"/>
+              <a:t>ultrasonicSensor</a:t>
+            </a:r>
+            <a:r>
+              <a:rPr lang="en-US" sz="1600" dirty="0"/>
+              <a:t>(13, 12); // ST_HW_HC_SR04(TRIG, ECHO)</a:t>
+            </a:r>
+          </a:p>
+          <a:p>
+            <a:pPr marL="0" indent="0">
+              <a:buNone/>
+            </a:pPr>
+            <a:r>
+              <a:rPr lang="en-US" sz="1600" dirty="0" smtClean="0"/>
+              <a:t>void </a:t>
+            </a:r>
+            <a:r>
+              <a:rPr lang="en-US" sz="1600" dirty="0"/>
+              <a:t>setup() {</a:t>
+            </a:r>
+          </a:p>
+          <a:p>
+            <a:pPr marL="0" indent="0">
+              <a:buNone/>
+            </a:pPr>
+            <a:r>
+              <a:rPr lang="en-US" sz="1600" dirty="0"/>
+              <a:t>    </a:t>
+            </a:r>
+            <a:r>
+              <a:rPr lang="en-US" sz="1600" dirty="0" err="1"/>
+              <a:t>Serial.begin</a:t>
+            </a:r>
+            <a:r>
+              <a:rPr lang="en-US" sz="1600" dirty="0"/>
+              <a:t>(9600</a:t>
+            </a:r>
+            <a:r>
+              <a:rPr lang="en-US" sz="1600" dirty="0" smtClean="0"/>
+              <a:t>);</a:t>
+            </a:r>
+            <a:endParaRPr lang="en-US" sz="1600" dirty="0"/>
+          </a:p>
+          <a:p>
+            <a:pPr marL="0" indent="0">
+              <a:buNone/>
+            </a:pPr>
+            <a:r>
+              <a:rPr lang="en-US" sz="1600" dirty="0" smtClean="0"/>
+              <a:t>}</a:t>
+            </a:r>
+            <a:endParaRPr lang="en-US" sz="1600" dirty="0"/>
+          </a:p>
+          <a:p>
+            <a:pPr marL="0" indent="0">
+              <a:buNone/>
+            </a:pPr>
+            <a:r>
+              <a:rPr lang="en-US" sz="1600" dirty="0" smtClean="0"/>
+              <a:t>void </a:t>
+            </a:r>
+            <a:r>
+              <a:rPr lang="en-US" sz="1600" dirty="0"/>
+              <a:t>loop() {</a:t>
+            </a:r>
+          </a:p>
+          <a:p>
+            <a:pPr marL="0" indent="0">
+              <a:buNone/>
+            </a:pPr>
+            <a:r>
+              <a:rPr lang="en-US" sz="1600" dirty="0"/>
+              <a:t>    </a:t>
+            </a:r>
+            <a:r>
+              <a:rPr lang="en-US" sz="1600" dirty="0" err="1"/>
+              <a:t>int</a:t>
+            </a:r>
+            <a:r>
+              <a:rPr lang="en-US" sz="1600" dirty="0"/>
+              <a:t> </a:t>
+            </a:r>
+            <a:r>
+              <a:rPr lang="en-US" sz="1600" dirty="0" err="1"/>
+              <a:t>hitTime</a:t>
+            </a:r>
+            <a:r>
+              <a:rPr lang="en-US" sz="1600" dirty="0"/>
+              <a:t> = </a:t>
+            </a:r>
+            <a:r>
+              <a:rPr lang="en-US" sz="1600" dirty="0" err="1"/>
+              <a:t>ultrasonicSensor.getHitTime</a:t>
+            </a:r>
+            <a:r>
+              <a:rPr lang="en-US" sz="1600" dirty="0"/>
+              <a:t>(); </a:t>
+            </a:r>
+          </a:p>
+          <a:p>
+            <a:pPr marL="0" indent="0">
+              <a:buNone/>
+            </a:pPr>
+            <a:r>
+              <a:rPr lang="en-US" sz="1600" dirty="0"/>
+              <a:t>    String message = "The </a:t>
+            </a:r>
+            <a:r>
+              <a:rPr lang="en-US" sz="1600" dirty="0" err="1" smtClean="0"/>
+              <a:t>tiempo</a:t>
+            </a:r>
+            <a:r>
+              <a:rPr lang="en-US" sz="1600" dirty="0" smtClean="0"/>
+              <a:t> </a:t>
+            </a:r>
+            <a:r>
+              <a:rPr lang="en-US" sz="1600" dirty="0" err="1" smtClean="0"/>
+              <a:t>fue</a:t>
+            </a:r>
+            <a:r>
+              <a:rPr lang="en-US" sz="1600" dirty="0" smtClean="0"/>
+              <a:t> </a:t>
+            </a:r>
+            <a:r>
+              <a:rPr lang="en-US" sz="1600" dirty="0"/>
+              <a:t>" + String(</a:t>
+            </a:r>
+            <a:r>
+              <a:rPr lang="en-US" sz="1600" dirty="0" err="1"/>
+              <a:t>hitTime</a:t>
+            </a:r>
+            <a:r>
+              <a:rPr lang="en-US" sz="1600" dirty="0"/>
+              <a:t>) + " </a:t>
+            </a:r>
+            <a:r>
+              <a:rPr lang="en-US" sz="1600" dirty="0" err="1" smtClean="0"/>
+              <a:t>microsegundos</a:t>
+            </a:r>
+            <a:r>
+              <a:rPr lang="en-US" sz="1600" dirty="0" smtClean="0"/>
+              <a:t>\n</a:t>
+            </a:r>
+            <a:r>
+              <a:rPr lang="en-US" sz="1600" dirty="0"/>
+              <a:t>";</a:t>
+            </a:r>
+          </a:p>
+          <a:p>
+            <a:pPr marL="0" indent="0">
+              <a:buNone/>
+            </a:pPr>
+            <a:r>
+              <a:rPr lang="en-US" sz="1600" dirty="0" smtClean="0"/>
+              <a:t>if</a:t>
+            </a:r>
+            <a:r>
+              <a:rPr lang="en-US" sz="1600" dirty="0"/>
+              <a:t>((</a:t>
+            </a:r>
+            <a:r>
+              <a:rPr lang="en-US" sz="1600" dirty="0" err="1"/>
+              <a:t>hitTime</a:t>
+            </a:r>
+            <a:r>
+              <a:rPr lang="en-US" sz="1600" dirty="0"/>
+              <a:t> == 0) &amp;&amp; (</a:t>
+            </a:r>
+            <a:r>
+              <a:rPr lang="en-US" sz="1600" dirty="0" err="1"/>
+              <a:t>ultrasonicSensor.getTimeout</a:t>
+            </a:r>
+            <a:r>
+              <a:rPr lang="en-US" sz="1600" dirty="0"/>
+              <a:t>() == 5000)) {</a:t>
+            </a:r>
+          </a:p>
+          <a:p>
+            <a:pPr marL="0" indent="0">
+              <a:buNone/>
+            </a:pPr>
+            <a:r>
+              <a:rPr lang="en-US" sz="1600" dirty="0"/>
+              <a:t>        </a:t>
+            </a:r>
+            <a:r>
+              <a:rPr lang="en-US" sz="1600" dirty="0" err="1"/>
+              <a:t>ultrasonicSensor.setTimeout</a:t>
+            </a:r>
+            <a:r>
+              <a:rPr lang="en-US" sz="1600" dirty="0"/>
+              <a:t>(23200);</a:t>
+            </a:r>
+          </a:p>
+          <a:p>
+            <a:pPr marL="0" indent="0">
+              <a:buNone/>
+            </a:pPr>
+            <a:r>
+              <a:rPr lang="en-US" sz="1600" dirty="0" smtClean="0"/>
+              <a:t>        </a:t>
+            </a:r>
+            <a:r>
+              <a:rPr lang="en-US" sz="1600" dirty="0"/>
+              <a:t>message += "[!] Timeout </a:t>
+            </a:r>
+            <a:r>
+              <a:rPr lang="en-US" sz="1600" dirty="0" err="1" smtClean="0"/>
+              <a:t>incrementado</a:t>
+            </a:r>
+            <a:r>
+              <a:rPr lang="en-US" sz="1600" dirty="0" smtClean="0"/>
+              <a:t> de 5000 </a:t>
+            </a:r>
+            <a:r>
+              <a:rPr lang="en-US" sz="1600" dirty="0"/>
+              <a:t>to 23200\n";</a:t>
+            </a:r>
+          </a:p>
+          <a:p>
+            <a:pPr marL="0" indent="0">
+              <a:buNone/>
+            </a:pPr>
+            <a:r>
+              <a:rPr lang="en-US" sz="1600" dirty="0"/>
+              <a:t>        message += "[!] </a:t>
+            </a:r>
+            <a:r>
+              <a:rPr lang="en-US" sz="1600" dirty="0" err="1" smtClean="0"/>
+              <a:t>si</a:t>
+            </a:r>
+            <a:r>
+              <a:rPr lang="en-US" sz="1600" dirty="0" smtClean="0"/>
+              <a:t> el </a:t>
+            </a:r>
+            <a:r>
+              <a:rPr lang="en-US" sz="1600" dirty="0" err="1" smtClean="0"/>
+              <a:t>tiempo</a:t>
+            </a:r>
+            <a:r>
+              <a:rPr lang="en-US" sz="1600" dirty="0" smtClean="0"/>
+              <a:t> </a:t>
+            </a:r>
+            <a:r>
+              <a:rPr lang="en-US" sz="1600" dirty="0" err="1" smtClean="0"/>
+              <a:t>es</a:t>
+            </a:r>
+            <a:r>
+              <a:rPr lang="en-US" sz="1600" dirty="0" smtClean="0"/>
+              <a:t> 0 </a:t>
+            </a:r>
+            <a:r>
+              <a:rPr lang="en-US" sz="1600" dirty="0" err="1" smtClean="0"/>
+              <a:t>despues</a:t>
+            </a:r>
+            <a:r>
+              <a:rPr lang="en-US" sz="1600" dirty="0" smtClean="0"/>
+              <a:t> de </a:t>
+            </a:r>
+            <a:r>
+              <a:rPr lang="en-US" sz="1600" dirty="0" err="1" smtClean="0"/>
+              <a:t>este</a:t>
+            </a:r>
+            <a:r>
+              <a:rPr lang="en-US" sz="1600" dirty="0" smtClean="0"/>
+              <a:t> </a:t>
+            </a:r>
+            <a:r>
+              <a:rPr lang="en-US" sz="1600" dirty="0" err="1" smtClean="0"/>
+              <a:t>mensaje</a:t>
+            </a:r>
+            <a:r>
+              <a:rPr lang="en-US" sz="1600" dirty="0" smtClean="0"/>
+              <a:t>, \n“;</a:t>
+            </a:r>
+            <a:endParaRPr lang="en-US" sz="1600" dirty="0"/>
+          </a:p>
+          <a:p>
+            <a:pPr marL="0" indent="0">
+              <a:buNone/>
+            </a:pPr>
+            <a:r>
+              <a:rPr lang="en-US" sz="1600" dirty="0" smtClean="0"/>
+              <a:t>}</a:t>
+            </a:r>
+            <a:endParaRPr lang="en-US" sz="1600" dirty="0"/>
+          </a:p>
+          <a:p>
+            <a:pPr marL="0" indent="0">
+              <a:buNone/>
+            </a:pPr>
+            <a:r>
+              <a:rPr lang="en-US" sz="1600" dirty="0"/>
+              <a:t>    </a:t>
+            </a:r>
+            <a:r>
+              <a:rPr lang="en-US" sz="1600" dirty="0" err="1"/>
+              <a:t>Serial.print</a:t>
+            </a:r>
+            <a:r>
+              <a:rPr lang="en-US" sz="1600" dirty="0"/>
+              <a:t>(message</a:t>
+            </a:r>
+            <a:r>
+              <a:rPr lang="en-US" sz="1600" dirty="0" smtClean="0"/>
+              <a:t>);</a:t>
+            </a:r>
+            <a:endParaRPr lang="en-US" sz="1600" dirty="0"/>
+          </a:p>
+          <a:p>
+            <a:pPr marL="0" indent="0">
+              <a:buNone/>
+            </a:pPr>
+            <a:r>
+              <a:rPr lang="en-US" sz="1600" dirty="0"/>
+              <a:t>    delay(1500</a:t>
+            </a:r>
+            <a:r>
+              <a:rPr lang="en-US" sz="1600" dirty="0" smtClean="0"/>
+              <a:t>);</a:t>
+            </a:r>
+          </a:p>
+          <a:p>
+            <a:pPr marL="0" indent="0">
+              <a:buNone/>
+            </a:pPr>
+            <a:r>
+              <a:rPr lang="en-US" sz="1600" dirty="0" smtClean="0"/>
+              <a:t>}</a:t>
+            </a:r>
+            <a:endParaRPr lang="es-ES" sz="1600" dirty="0"/>
           </a:p>
         </p:txBody>
       </p:sp>
     </p:spTree>
     <p:extLst>
       <p:ext uri="{BB962C8B-B14F-4D97-AF65-F5344CB8AC3E}">
-        <p14:creationId xmlns:p14="http://schemas.microsoft.com/office/powerpoint/2010/main" val="3485866404"/>
+        <p14:creationId xmlns:p14="http://schemas.microsoft.com/office/powerpoint/2010/main" val="4225102005"/>
       </p:ext>
     </p:extLst>
   </p:cSld>
   <p:clrMapOvr>
     <a:masterClrMapping/>
   </p:clrMapOvr>
-  <p:timing>
-    <p:tnLst>
-      <p:par>
-        <p:cTn id="1" dur="indefinite" restart="never" nodeType="tmRoot"/>
-      </p:par>
-    </p:tnLst>
-  </p:timing>
 </p:sld>
 </file>
 
@@ -11563,24 +13066,79 @@
         </p:blipFill>
         <p:spPr>
           <a:xfrm>
-            <a:off x="3404205" y="1359872"/>
-            <a:ext cx="6049284" cy="5085610"/>
+            <a:off x="1105184" y="1417638"/>
+            <a:ext cx="4082410" cy="4082410"/>
           </a:xfrm>
           <a:prstGeom prst="rect">
             <a:avLst/>
           </a:prstGeom>
         </p:spPr>
       </p:pic>
+      <p:sp>
+        <p:nvSpPr>
+          <p:cNvPr id="5" name="CuadroTexto 4"/>
+          <p:cNvSpPr txBox="1"/>
+          <p:nvPr/>
+        </p:nvSpPr>
+        <p:spPr>
+          <a:xfrm>
+            <a:off x="5663821" y="2183642"/>
+            <a:ext cx="5650173" cy="954107"/>
+          </a:xfrm>
+          <a:prstGeom prst="rect">
+            <a:avLst/>
+          </a:prstGeom>
+          <a:noFill/>
+        </p:spPr>
+        <p:txBody>
+          <a:bodyPr wrap="square" rtlCol="0">
+            <a:spAutoFit/>
+          </a:bodyPr>
+          <a:lstStyle/>
+          <a:p>
+            <a:pPr marL="285750" indent="-285750">
+              <a:buFont typeface="Arial" panose="020B0604020202020204" pitchFamily="34" charset="0"/>
+              <a:buChar char="•"/>
+            </a:pPr>
+            <a:r>
+              <a:rPr lang="es-CL" sz="2800" dirty="0" smtClean="0"/>
+              <a:t>Temperatura (°C)</a:t>
+            </a:r>
+          </a:p>
+          <a:p>
+            <a:pPr marL="285750" indent="-285750">
+              <a:buFont typeface="Arial" panose="020B0604020202020204" pitchFamily="34" charset="0"/>
+              <a:buChar char="•"/>
+            </a:pPr>
+            <a:r>
+              <a:rPr lang="es-CL" sz="2800" dirty="0" smtClean="0"/>
+              <a:t>Humedad ambiente (%</a:t>
+            </a:r>
+            <a:r>
+              <a:rPr lang="es-ES" sz="2800" dirty="0"/>
+              <a:t>)</a:t>
+            </a:r>
+            <a:endParaRPr lang="es-CL" sz="2800" dirty="0" smtClean="0"/>
+          </a:p>
+        </p:txBody>
+      </p:sp>
     </p:spTree>
     <p:extLst>
       <p:ext uri="{BB962C8B-B14F-4D97-AF65-F5344CB8AC3E}">
-        <p14:creationId xmlns:p14="http://schemas.microsoft.com/office/powerpoint/2010/main" val="3057113510"/>
+        <p14:creationId xmlns:p14="http://schemas.microsoft.com/office/powerpoint/2010/main" val="3485866404"/>
       </p:ext>
     </p:extLst>
   </p:cSld>
   <p:clrMapOvr>
     <a:masterClrMapping/>
   </p:clrMapOvr>
+  <p:timing>
+    <p:tnLst>
+      <p:par>
+        <p:cTn id="1" dur="indefinite" restart="never" nodeType="tmRoot"/>
+      </p:par>
+    </p:tnLst>
+  </p:timing>
 </p:sld>
 </file>
 

</xml_diff>

<commit_message>
se añade cod de ejemplo leds a ppt
</commit_message>
<xml_diff>
--- a/Arduino/arduino.pptx
+++ b/Arduino/arduino.pptx
@@ -12,18 +12,19 @@
     <p:sldId id="264" r:id="rId6"/>
     <p:sldId id="265" r:id="rId7"/>
     <p:sldId id="260" r:id="rId8"/>
-    <p:sldId id="258" r:id="rId9"/>
-    <p:sldId id="266" r:id="rId10"/>
-    <p:sldId id="271" r:id="rId11"/>
-    <p:sldId id="259" r:id="rId12"/>
-    <p:sldId id="267" r:id="rId13"/>
-    <p:sldId id="268" r:id="rId14"/>
-    <p:sldId id="270" r:id="rId15"/>
-    <p:sldId id="261" r:id="rId16"/>
-    <p:sldId id="272" r:id="rId17"/>
-    <p:sldId id="257" r:id="rId18"/>
-    <p:sldId id="262" r:id="rId19"/>
-    <p:sldId id="269" r:id="rId20"/>
+    <p:sldId id="273" r:id="rId9"/>
+    <p:sldId id="258" r:id="rId10"/>
+    <p:sldId id="266" r:id="rId11"/>
+    <p:sldId id="271" r:id="rId12"/>
+    <p:sldId id="259" r:id="rId13"/>
+    <p:sldId id="267" r:id="rId14"/>
+    <p:sldId id="268" r:id="rId15"/>
+    <p:sldId id="270" r:id="rId16"/>
+    <p:sldId id="261" r:id="rId17"/>
+    <p:sldId id="272" r:id="rId18"/>
+    <p:sldId id="257" r:id="rId19"/>
+    <p:sldId id="262" r:id="rId20"/>
+    <p:sldId id="269" r:id="rId21"/>
   </p:sldIdLst>
   <p:sldSz cx="12192000" cy="6858000"/>
   <p:notesSz cx="6858000" cy="9144000"/>
@@ -10191,6 +10192,140 @@
         </p:blipFill>
         <p:spPr>
           <a:xfrm>
+            <a:off x="1105184" y="1417638"/>
+            <a:ext cx="4082410" cy="4082410"/>
+          </a:xfrm>
+          <a:prstGeom prst="rect">
+            <a:avLst/>
+          </a:prstGeom>
+        </p:spPr>
+      </p:pic>
+      <p:sp>
+        <p:nvSpPr>
+          <p:cNvPr id="5" name="CuadroTexto 4"/>
+          <p:cNvSpPr txBox="1"/>
+          <p:nvPr/>
+        </p:nvSpPr>
+        <p:spPr>
+          <a:xfrm>
+            <a:off x="5663821" y="2183642"/>
+            <a:ext cx="5650173" cy="954107"/>
+          </a:xfrm>
+          <a:prstGeom prst="rect">
+            <a:avLst/>
+          </a:prstGeom>
+          <a:noFill/>
+        </p:spPr>
+        <p:txBody>
+          <a:bodyPr wrap="square" rtlCol="0">
+            <a:spAutoFit/>
+          </a:bodyPr>
+          <a:lstStyle/>
+          <a:p>
+            <a:pPr marL="285750" indent="-285750">
+              <a:buFont typeface="Arial" panose="020B0604020202020204" pitchFamily="34" charset="0"/>
+              <a:buChar char="•"/>
+            </a:pPr>
+            <a:r>
+              <a:rPr lang="es-CL" sz="2800" dirty="0" smtClean="0"/>
+              <a:t>Temperatura (°C)</a:t>
+            </a:r>
+          </a:p>
+          <a:p>
+            <a:pPr marL="285750" indent="-285750">
+              <a:buFont typeface="Arial" panose="020B0604020202020204" pitchFamily="34" charset="0"/>
+              <a:buChar char="•"/>
+            </a:pPr>
+            <a:r>
+              <a:rPr lang="es-CL" sz="2800" dirty="0" smtClean="0"/>
+              <a:t>Humedad ambiente (%</a:t>
+            </a:r>
+            <a:r>
+              <a:rPr lang="es-ES" sz="2800" dirty="0"/>
+              <a:t>)</a:t>
+            </a:r>
+            <a:endParaRPr lang="es-CL" sz="2800" dirty="0" smtClean="0"/>
+          </a:p>
+        </p:txBody>
+      </p:sp>
+    </p:spTree>
+    <p:extLst>
+      <p:ext uri="{BB962C8B-B14F-4D97-AF65-F5344CB8AC3E}">
+        <p14:creationId xmlns:p14="http://schemas.microsoft.com/office/powerpoint/2010/main" val="3485866404"/>
+      </p:ext>
+    </p:extLst>
+  </p:cSld>
+  <p:clrMapOvr>
+    <a:masterClrMapping/>
+  </p:clrMapOvr>
+  <p:timing>
+    <p:tnLst>
+      <p:par>
+        <p:cTn id="1" dur="indefinite" restart="never" nodeType="tmRoot"/>
+      </p:par>
+    </p:tnLst>
+  </p:timing>
+</p:sld>
+</file>
+
+<file path=ppt/slides/slide11.xml><?xml version="1.0" encoding="utf-8"?>
+<p:sld xmlns:a="http://schemas.openxmlformats.org/drawingml/2006/main" xmlns:r="http://schemas.openxmlformats.org/officeDocument/2006/relationships" xmlns:p="http://schemas.openxmlformats.org/presentationml/2006/main">
+  <p:cSld>
+    <p:spTree>
+      <p:nvGrpSpPr>
+        <p:cNvPr id="1" name=""/>
+        <p:cNvGrpSpPr/>
+        <p:nvPr/>
+      </p:nvGrpSpPr>
+      <p:grpSpPr>
+        <a:xfrm>
+          <a:off x="0" y="0"/>
+          <a:ext cx="0" cy="0"/>
+          <a:chOff x="0" y="0"/>
+          <a:chExt cx="0" cy="0"/>
+        </a:xfrm>
+      </p:grpSpPr>
+      <p:sp>
+        <p:nvSpPr>
+          <p:cNvPr id="2" name="Título 1"/>
+          <p:cNvSpPr>
+            <a:spLocks noGrp="1"/>
+          </p:cNvSpPr>
+          <p:nvPr>
+            <p:ph type="title"/>
+          </p:nvPr>
+        </p:nvSpPr>
+        <p:spPr/>
+        <p:txBody>
+          <a:bodyPr/>
+          <a:lstStyle/>
+          <a:p>
+            <a:r>
+              <a:rPr lang="es-CL" dirty="0" smtClean="0"/>
+              <a:t>Sensor DHT11</a:t>
+            </a:r>
+            <a:endParaRPr lang="es-ES" dirty="0"/>
+          </a:p>
+        </p:txBody>
+      </p:sp>
+      <p:pic>
+        <p:nvPicPr>
+          <p:cNvPr id="4" name="Marcador de contenido 3"/>
+          <p:cNvPicPr>
+            <a:picLocks noGrp="1" noChangeAspect="1"/>
+          </p:cNvPicPr>
+          <p:nvPr>
+            <p:ph idx="1"/>
+          </p:nvPr>
+        </p:nvPicPr>
+        <p:blipFill>
+          <a:blip r:embed="rId2"/>
+          <a:stretch>
+            <a:fillRect/>
+          </a:stretch>
+        </p:blipFill>
+        <p:spPr>
+          <a:xfrm>
             <a:off x="3404205" y="1359872"/>
             <a:ext cx="6049284" cy="5085610"/>
           </a:xfrm>
@@ -10212,7 +10347,7 @@
 </p:sld>
 </file>
 
-<file path=ppt/slides/slide11.xml><?xml version="1.0" encoding="utf-8"?>
+<file path=ppt/slides/slide12.xml><?xml version="1.0" encoding="utf-8"?>
 <p:sld xmlns:a="http://schemas.openxmlformats.org/drawingml/2006/main" xmlns:r="http://schemas.openxmlformats.org/officeDocument/2006/relationships" xmlns:p="http://schemas.openxmlformats.org/presentationml/2006/main">
   <p:cSld>
     <p:spTree>
@@ -10291,7 +10426,7 @@
 </p:sld>
 </file>
 
-<file path=ppt/slides/slide12.xml><?xml version="1.0" encoding="utf-8"?>
+<file path=ppt/slides/slide13.xml><?xml version="1.0" encoding="utf-8"?>
 <p:sld xmlns:a="http://schemas.openxmlformats.org/drawingml/2006/main" xmlns:r="http://schemas.openxmlformats.org/officeDocument/2006/relationships" xmlns:p="http://schemas.openxmlformats.org/presentationml/2006/main">
   <p:cSld>
     <p:spTree>
@@ -10874,7 +11009,7 @@
 </p:sld>
 </file>
 
-<file path=ppt/slides/slide13.xml><?xml version="1.0" encoding="utf-8"?>
+<file path=ppt/slides/slide14.xml><?xml version="1.0" encoding="utf-8"?>
 <p:sld xmlns:a="http://schemas.openxmlformats.org/drawingml/2006/main" xmlns:r="http://schemas.openxmlformats.org/officeDocument/2006/relationships" xmlns:p="http://schemas.openxmlformats.org/presentationml/2006/main">
   <p:cSld>
     <p:spTree>
@@ -11010,7 +11145,7 @@
 </p:sld>
 </file>
 
-<file path=ppt/slides/slide14.xml><?xml version="1.0" encoding="utf-8"?>
+<file path=ppt/slides/slide15.xml><?xml version="1.0" encoding="utf-8"?>
 <p:sld xmlns:a="http://schemas.openxmlformats.org/drawingml/2006/main" xmlns:r="http://schemas.openxmlformats.org/officeDocument/2006/relationships" xmlns:p="http://schemas.openxmlformats.org/presentationml/2006/main">
   <p:cSld>
     <p:spTree>
@@ -11561,7 +11696,7 @@
 </p:sld>
 </file>
 
-<file path=ppt/slides/slide15.xml><?xml version="1.0" encoding="utf-8"?>
+<file path=ppt/slides/slide16.xml><?xml version="1.0" encoding="utf-8"?>
 <p:sld xmlns:a="http://schemas.openxmlformats.org/drawingml/2006/main" xmlns:r="http://schemas.openxmlformats.org/officeDocument/2006/relationships" xmlns:p="http://schemas.openxmlformats.org/presentationml/2006/main">
   <p:cSld>
     <p:spTree>
@@ -11644,7 +11779,7 @@
 </p:sld>
 </file>
 
-<file path=ppt/slides/slide16.xml><?xml version="1.0" encoding="utf-8"?>
+<file path=ppt/slides/slide17.xml><?xml version="1.0" encoding="utf-8"?>
 <p:sld xmlns:a="http://schemas.openxmlformats.org/drawingml/2006/main" xmlns:r="http://schemas.openxmlformats.org/officeDocument/2006/relationships" xmlns:p="http://schemas.openxmlformats.org/presentationml/2006/main">
   <p:cSld>
     <p:spTree>
@@ -11727,7 +11862,7 @@
 </p:sld>
 </file>
 
-<file path=ppt/slides/slide17.xml><?xml version="1.0" encoding="utf-8"?>
+<file path=ppt/slides/slide18.xml><?xml version="1.0" encoding="utf-8"?>
 <p:sld xmlns:a="http://schemas.openxmlformats.org/drawingml/2006/main" xmlns:r="http://schemas.openxmlformats.org/officeDocument/2006/relationships" xmlns:p="http://schemas.openxmlformats.org/presentationml/2006/main">
   <p:cSld>
     <p:spTree>
@@ -12403,6 +12538,382 @@
           <a:p>
             <a:r>
               <a:rPr lang="es-CL" dirty="0" smtClean="0"/>
+              <a:t>Leds - Ejemplo</a:t>
+            </a:r>
+            <a:endParaRPr lang="es-ES" dirty="0"/>
+          </a:p>
+        </p:txBody>
+      </p:sp>
+      <p:sp>
+        <p:nvSpPr>
+          <p:cNvPr id="3" name="Marcador de contenido 2"/>
+          <p:cNvSpPr>
+            <a:spLocks noGrp="1"/>
+          </p:cNvSpPr>
+          <p:nvPr>
+            <p:ph idx="1"/>
+          </p:nvPr>
+        </p:nvSpPr>
+        <p:spPr/>
+        <p:txBody>
+          <a:bodyPr>
+            <a:normAutofit fontScale="47500" lnSpcReduction="20000"/>
+          </a:bodyPr>
+          <a:lstStyle/>
+          <a:p>
+            <a:pPr marL="0" indent="0">
+              <a:buNone/>
+            </a:pPr>
+            <a:r>
+              <a:rPr lang="es-ES" dirty="0" err="1"/>
+              <a:t>void</a:t>
+            </a:r>
+            <a:r>
+              <a:rPr lang="es-ES" dirty="0"/>
+              <a:t> </a:t>
+            </a:r>
+            <a:r>
+              <a:rPr lang="es-ES" dirty="0" err="1"/>
+              <a:t>setup</a:t>
+            </a:r>
+            <a:r>
+              <a:rPr lang="es-ES" dirty="0"/>
+              <a:t>() {</a:t>
+            </a:r>
+          </a:p>
+          <a:p>
+            <a:pPr marL="0" indent="0">
+              <a:buNone/>
+            </a:pPr>
+            <a:r>
+              <a:rPr lang="es-ES" dirty="0"/>
+              <a:t>  </a:t>
+            </a:r>
+            <a:r>
+              <a:rPr lang="es-ES" dirty="0" err="1"/>
+              <a:t>pinMode</a:t>
+            </a:r>
+            <a:r>
+              <a:rPr lang="es-ES" dirty="0"/>
+              <a:t>(3,OUTPUT);</a:t>
+            </a:r>
+          </a:p>
+          <a:p>
+            <a:pPr marL="0" indent="0">
+              <a:buNone/>
+            </a:pPr>
+            <a:r>
+              <a:rPr lang="es-ES" dirty="0"/>
+              <a:t>  </a:t>
+            </a:r>
+            <a:r>
+              <a:rPr lang="es-ES" dirty="0" err="1"/>
+              <a:t>pinMode</a:t>
+            </a:r>
+            <a:r>
+              <a:rPr lang="es-ES" dirty="0"/>
+              <a:t>(4,OUTPUT);</a:t>
+            </a:r>
+          </a:p>
+          <a:p>
+            <a:pPr marL="0" indent="0">
+              <a:buNone/>
+            </a:pPr>
+            <a:r>
+              <a:rPr lang="es-ES" dirty="0"/>
+              <a:t>  </a:t>
+            </a:r>
+            <a:r>
+              <a:rPr lang="es-ES" dirty="0" err="1"/>
+              <a:t>pinMode</a:t>
+            </a:r>
+            <a:r>
+              <a:rPr lang="es-ES" dirty="0"/>
+              <a:t>(5,OUTPUT);</a:t>
+            </a:r>
+          </a:p>
+          <a:p>
+            <a:pPr marL="0" indent="0">
+              <a:buNone/>
+            </a:pPr>
+            <a:r>
+              <a:rPr lang="es-ES" dirty="0"/>
+              <a:t>  </a:t>
+            </a:r>
+            <a:r>
+              <a:rPr lang="es-ES" dirty="0" err="1"/>
+              <a:t>pinMode</a:t>
+            </a:r>
+            <a:r>
+              <a:rPr lang="es-ES" dirty="0"/>
+              <a:t>(6,OUTPUT);</a:t>
+            </a:r>
+          </a:p>
+          <a:p>
+            <a:pPr marL="0" indent="0">
+              <a:buNone/>
+            </a:pPr>
+            <a:r>
+              <a:rPr lang="es-ES" dirty="0"/>
+              <a:t>}</a:t>
+            </a:r>
+          </a:p>
+          <a:p>
+            <a:pPr marL="0" indent="0">
+              <a:buNone/>
+            </a:pPr>
+            <a:endParaRPr lang="es-ES" dirty="0"/>
+          </a:p>
+          <a:p>
+            <a:pPr marL="0" indent="0">
+              <a:buNone/>
+            </a:pPr>
+            <a:r>
+              <a:rPr lang="es-ES" dirty="0" err="1"/>
+              <a:t>void</a:t>
+            </a:r>
+            <a:r>
+              <a:rPr lang="es-ES" dirty="0"/>
+              <a:t> </a:t>
+            </a:r>
+            <a:r>
+              <a:rPr lang="es-ES" dirty="0" err="1"/>
+              <a:t>loop</a:t>
+            </a:r>
+            <a:r>
+              <a:rPr lang="es-ES" dirty="0"/>
+              <a:t>() {</a:t>
+            </a:r>
+          </a:p>
+          <a:p>
+            <a:pPr marL="0" indent="0">
+              <a:buNone/>
+            </a:pPr>
+            <a:r>
+              <a:rPr lang="es-ES" dirty="0"/>
+              <a:t>  </a:t>
+            </a:r>
+            <a:r>
+              <a:rPr lang="es-ES" dirty="0" err="1"/>
+              <a:t>digitalWrite</a:t>
+            </a:r>
+            <a:r>
+              <a:rPr lang="es-ES" dirty="0"/>
+              <a:t>(3,HIGH);</a:t>
+            </a:r>
+          </a:p>
+          <a:p>
+            <a:pPr marL="0" indent="0">
+              <a:buNone/>
+            </a:pPr>
+            <a:r>
+              <a:rPr lang="es-ES" dirty="0"/>
+              <a:t>  </a:t>
+            </a:r>
+            <a:r>
+              <a:rPr lang="es-ES" dirty="0" err="1"/>
+              <a:t>digitalWrite</a:t>
+            </a:r>
+            <a:r>
+              <a:rPr lang="es-ES" dirty="0"/>
+              <a:t>(4,HIGH);</a:t>
+            </a:r>
+          </a:p>
+          <a:p>
+            <a:pPr marL="0" indent="0">
+              <a:buNone/>
+            </a:pPr>
+            <a:r>
+              <a:rPr lang="es-ES" dirty="0"/>
+              <a:t>  </a:t>
+            </a:r>
+            <a:r>
+              <a:rPr lang="es-ES" dirty="0" err="1"/>
+              <a:t>digitalWrite</a:t>
+            </a:r>
+            <a:r>
+              <a:rPr lang="es-ES" dirty="0"/>
+              <a:t>(5,HIGH);</a:t>
+            </a:r>
+          </a:p>
+          <a:p>
+            <a:pPr marL="0" indent="0">
+              <a:buNone/>
+            </a:pPr>
+            <a:r>
+              <a:rPr lang="es-ES" dirty="0"/>
+              <a:t>  </a:t>
+            </a:r>
+            <a:r>
+              <a:rPr lang="es-ES" dirty="0" err="1"/>
+              <a:t>digitalWrite</a:t>
+            </a:r>
+            <a:r>
+              <a:rPr lang="es-ES" dirty="0"/>
+              <a:t>(6,HIGH);</a:t>
+            </a:r>
+          </a:p>
+          <a:p>
+            <a:pPr marL="0" indent="0">
+              <a:buNone/>
+            </a:pPr>
+            <a:r>
+              <a:rPr lang="es-ES" dirty="0"/>
+              <a:t>  </a:t>
+            </a:r>
+            <a:r>
+              <a:rPr lang="es-ES" dirty="0" err="1"/>
+              <a:t>delay</a:t>
+            </a:r>
+            <a:r>
+              <a:rPr lang="es-ES" dirty="0"/>
+              <a:t>(500);</a:t>
+            </a:r>
+          </a:p>
+          <a:p>
+            <a:pPr marL="0" indent="0">
+              <a:buNone/>
+            </a:pPr>
+            <a:r>
+              <a:rPr lang="es-ES" dirty="0"/>
+              <a:t>  </a:t>
+            </a:r>
+            <a:r>
+              <a:rPr lang="es-ES" dirty="0" err="1"/>
+              <a:t>digitalWrite</a:t>
+            </a:r>
+            <a:r>
+              <a:rPr lang="es-ES" dirty="0"/>
+              <a:t>(3,LOW);</a:t>
+            </a:r>
+          </a:p>
+          <a:p>
+            <a:pPr marL="0" indent="0">
+              <a:buNone/>
+            </a:pPr>
+            <a:r>
+              <a:rPr lang="es-ES" dirty="0"/>
+              <a:t>  </a:t>
+            </a:r>
+            <a:r>
+              <a:rPr lang="es-ES" dirty="0" err="1"/>
+              <a:t>digitalWrite</a:t>
+            </a:r>
+            <a:r>
+              <a:rPr lang="es-ES" dirty="0"/>
+              <a:t>(4,LOW);</a:t>
+            </a:r>
+          </a:p>
+          <a:p>
+            <a:pPr marL="0" indent="0">
+              <a:buNone/>
+            </a:pPr>
+            <a:r>
+              <a:rPr lang="es-ES" dirty="0"/>
+              <a:t>  </a:t>
+            </a:r>
+            <a:r>
+              <a:rPr lang="es-ES" dirty="0" err="1"/>
+              <a:t>digitalWrite</a:t>
+            </a:r>
+            <a:r>
+              <a:rPr lang="es-ES" dirty="0"/>
+              <a:t>(5,LOW);</a:t>
+            </a:r>
+          </a:p>
+          <a:p>
+            <a:pPr marL="0" indent="0">
+              <a:buNone/>
+            </a:pPr>
+            <a:r>
+              <a:rPr lang="es-ES" dirty="0"/>
+              <a:t>  </a:t>
+            </a:r>
+            <a:r>
+              <a:rPr lang="es-ES" dirty="0" err="1"/>
+              <a:t>digitalWrite</a:t>
+            </a:r>
+            <a:r>
+              <a:rPr lang="es-ES" dirty="0"/>
+              <a:t>(6,LOW);</a:t>
+            </a:r>
+          </a:p>
+          <a:p>
+            <a:pPr marL="0" indent="0">
+              <a:buNone/>
+            </a:pPr>
+            <a:r>
+              <a:rPr lang="es-ES" dirty="0"/>
+              <a:t>  </a:t>
+            </a:r>
+            <a:r>
+              <a:rPr lang="es-ES" dirty="0" err="1"/>
+              <a:t>delay</a:t>
+            </a:r>
+            <a:r>
+              <a:rPr lang="es-ES" dirty="0"/>
+              <a:t>(500);</a:t>
+            </a:r>
+          </a:p>
+          <a:p>
+            <a:pPr marL="0" indent="0">
+              <a:buNone/>
+            </a:pPr>
+            <a:r>
+              <a:rPr lang="es-ES"/>
+              <a:t>}</a:t>
+            </a:r>
+            <a:endParaRPr lang="es-ES" dirty="0"/>
+          </a:p>
+        </p:txBody>
+      </p:sp>
+    </p:spTree>
+    <p:extLst>
+      <p:ext uri="{BB962C8B-B14F-4D97-AF65-F5344CB8AC3E}">
+        <p14:creationId xmlns:p14="http://schemas.microsoft.com/office/powerpoint/2010/main" val="581482058"/>
+      </p:ext>
+    </p:extLst>
+  </p:cSld>
+  <p:clrMapOvr>
+    <a:masterClrMapping/>
+  </p:clrMapOvr>
+</p:sld>
+</file>
+
+<file path=ppt/slides/slide7.xml><?xml version="1.0" encoding="utf-8"?>
+<p:sld xmlns:a="http://schemas.openxmlformats.org/drawingml/2006/main" xmlns:r="http://schemas.openxmlformats.org/officeDocument/2006/relationships" xmlns:p="http://schemas.openxmlformats.org/presentationml/2006/main">
+  <p:cSld>
+    <p:spTree>
+      <p:nvGrpSpPr>
+        <p:cNvPr id="1" name=""/>
+        <p:cNvGrpSpPr/>
+        <p:nvPr/>
+      </p:nvGrpSpPr>
+      <p:grpSpPr>
+        <a:xfrm>
+          <a:off x="0" y="0"/>
+          <a:ext cx="0" cy="0"/>
+          <a:chOff x="0" y="0"/>
+          <a:chExt cx="0" cy="0"/>
+        </a:xfrm>
+      </p:grpSpPr>
+      <p:sp>
+        <p:nvSpPr>
+          <p:cNvPr id="2" name="Título 1"/>
+          <p:cNvSpPr>
+            <a:spLocks noGrp="1"/>
+          </p:cNvSpPr>
+          <p:nvPr>
+            <p:ph type="title"/>
+          </p:nvPr>
+        </p:nvSpPr>
+        <p:spPr/>
+        <p:txBody>
+          <a:bodyPr/>
+          <a:lstStyle/>
+          <a:p>
+            <a:r>
+              <a:rPr lang="es-CL" dirty="0" smtClean="0"/>
               <a:t>Sensor HC-SR04</a:t>
             </a:r>
             <a:endParaRPr lang="es-ES" dirty="0"/>
@@ -12499,7 +13010,7 @@
 </p:sld>
 </file>
 
-<file path=ppt/slides/slide7.xml><?xml version="1.0" encoding="utf-8"?>
+<file path=ppt/slides/slide8.xml><?xml version="1.0" encoding="utf-8"?>
 <p:sld xmlns:a="http://schemas.openxmlformats.org/drawingml/2006/main" xmlns:r="http://schemas.openxmlformats.org/officeDocument/2006/relationships" xmlns:p="http://schemas.openxmlformats.org/presentationml/2006/main">
   <p:cSld>
     <p:spTree>
@@ -12578,436 +13089,6 @@
 </p:sld>
 </file>
 
-<file path=ppt/slides/slide8.xml><?xml version="1.0" encoding="utf-8"?>
-<p:sld xmlns:a="http://schemas.openxmlformats.org/drawingml/2006/main" xmlns:r="http://schemas.openxmlformats.org/officeDocument/2006/relationships" xmlns:p="http://schemas.openxmlformats.org/presentationml/2006/main">
-  <p:cSld>
-    <p:spTree>
-      <p:nvGrpSpPr>
-        <p:cNvPr id="1" name=""/>
-        <p:cNvGrpSpPr/>
-        <p:nvPr/>
-      </p:nvGrpSpPr>
-      <p:grpSpPr>
-        <a:xfrm>
-          <a:off x="0" y="0"/>
-          <a:ext cx="0" cy="0"/>
-          <a:chOff x="0" y="0"/>
-          <a:chExt cx="0" cy="0"/>
-        </a:xfrm>
-      </p:grpSpPr>
-      <p:sp>
-        <p:nvSpPr>
-          <p:cNvPr id="2" name="Título 1"/>
-          <p:cNvSpPr>
-            <a:spLocks noGrp="1"/>
-          </p:cNvSpPr>
-          <p:nvPr>
-            <p:ph type="title"/>
-          </p:nvPr>
-        </p:nvSpPr>
-        <p:spPr/>
-        <p:txBody>
-          <a:bodyPr/>
-          <a:lstStyle/>
-          <a:p>
-            <a:r>
-              <a:rPr lang="es-CL" dirty="0" smtClean="0"/>
-              <a:t>HC-SR04 Ejemplo</a:t>
-            </a:r>
-            <a:endParaRPr lang="es-ES" dirty="0"/>
-          </a:p>
-        </p:txBody>
-      </p:sp>
-      <p:sp>
-        <p:nvSpPr>
-          <p:cNvPr id="3" name="Marcador de contenido 2"/>
-          <p:cNvSpPr>
-            <a:spLocks noGrp="1"/>
-          </p:cNvSpPr>
-          <p:nvPr>
-            <p:ph idx="1"/>
-          </p:nvPr>
-        </p:nvSpPr>
-        <p:spPr>
-          <a:xfrm>
-            <a:off x="609600" y="1417638"/>
-            <a:ext cx="10972800" cy="4525963"/>
-          </a:xfrm>
-        </p:spPr>
-        <p:txBody>
-          <a:bodyPr>
-            <a:noAutofit/>
-          </a:bodyPr>
-          <a:lstStyle/>
-          <a:p>
-            <a:pPr marL="0" indent="0">
-              <a:buNone/>
-            </a:pPr>
-            <a:r>
-              <a:rPr lang="en-US" sz="1600" dirty="0" smtClean="0"/>
-              <a:t>#</a:t>
-            </a:r>
-            <a:r>
-              <a:rPr lang="en-US" sz="1600" dirty="0"/>
-              <a:t>include &lt;ST_HW_HC_SR04.h&gt;</a:t>
-            </a:r>
-          </a:p>
-          <a:p>
-            <a:pPr marL="0" indent="0">
-              <a:buNone/>
-            </a:pPr>
-            <a:r>
-              <a:rPr lang="en-US" sz="1600" dirty="0" smtClean="0"/>
-              <a:t>ST_HW_HC_SR04 </a:t>
-            </a:r>
-            <a:r>
-              <a:rPr lang="en-US" sz="1600" dirty="0" err="1"/>
-              <a:t>ultrasonicSensor</a:t>
-            </a:r>
-            <a:r>
-              <a:rPr lang="en-US" sz="1600" dirty="0"/>
-              <a:t>(13, 12); // ST_HW_HC_SR04(TRIG, ECHO)</a:t>
-            </a:r>
-          </a:p>
-          <a:p>
-            <a:pPr marL="0" indent="0">
-              <a:buNone/>
-            </a:pPr>
-            <a:r>
-              <a:rPr lang="en-US" sz="1600" dirty="0" smtClean="0"/>
-              <a:t>void </a:t>
-            </a:r>
-            <a:r>
-              <a:rPr lang="en-US" sz="1600" dirty="0"/>
-              <a:t>setup() {</a:t>
-            </a:r>
-          </a:p>
-          <a:p>
-            <a:pPr marL="0" indent="0">
-              <a:buNone/>
-            </a:pPr>
-            <a:r>
-              <a:rPr lang="en-US" sz="1600" dirty="0"/>
-              <a:t>    </a:t>
-            </a:r>
-            <a:r>
-              <a:rPr lang="en-US" sz="1600" dirty="0" err="1"/>
-              <a:t>Serial.begin</a:t>
-            </a:r>
-            <a:r>
-              <a:rPr lang="en-US" sz="1600" dirty="0"/>
-              <a:t>(9600</a:t>
-            </a:r>
-            <a:r>
-              <a:rPr lang="en-US" sz="1600" dirty="0" smtClean="0"/>
-              <a:t>);</a:t>
-            </a:r>
-            <a:endParaRPr lang="en-US" sz="1600" dirty="0"/>
-          </a:p>
-          <a:p>
-            <a:pPr marL="0" indent="0">
-              <a:buNone/>
-            </a:pPr>
-            <a:r>
-              <a:rPr lang="en-US" sz="1600" dirty="0" smtClean="0"/>
-              <a:t>}</a:t>
-            </a:r>
-            <a:endParaRPr lang="en-US" sz="1600" dirty="0"/>
-          </a:p>
-          <a:p>
-            <a:pPr marL="0" indent="0">
-              <a:buNone/>
-            </a:pPr>
-            <a:r>
-              <a:rPr lang="en-US" sz="1600" dirty="0" smtClean="0"/>
-              <a:t>void </a:t>
-            </a:r>
-            <a:r>
-              <a:rPr lang="en-US" sz="1600" dirty="0"/>
-              <a:t>loop() {</a:t>
-            </a:r>
-          </a:p>
-          <a:p>
-            <a:pPr marL="0" indent="0">
-              <a:buNone/>
-            </a:pPr>
-            <a:r>
-              <a:rPr lang="en-US" sz="1600" dirty="0"/>
-              <a:t>    </a:t>
-            </a:r>
-            <a:r>
-              <a:rPr lang="en-US" sz="1600" dirty="0" err="1"/>
-              <a:t>int</a:t>
-            </a:r>
-            <a:r>
-              <a:rPr lang="en-US" sz="1600" dirty="0"/>
-              <a:t> </a:t>
-            </a:r>
-            <a:r>
-              <a:rPr lang="en-US" sz="1600" dirty="0" err="1"/>
-              <a:t>hitTime</a:t>
-            </a:r>
-            <a:r>
-              <a:rPr lang="en-US" sz="1600" dirty="0"/>
-              <a:t> = </a:t>
-            </a:r>
-            <a:r>
-              <a:rPr lang="en-US" sz="1600" dirty="0" err="1"/>
-              <a:t>ultrasonicSensor.getHitTime</a:t>
-            </a:r>
-            <a:r>
-              <a:rPr lang="en-US" sz="1600" dirty="0"/>
-              <a:t>(); </a:t>
-            </a:r>
-          </a:p>
-          <a:p>
-            <a:pPr marL="0" indent="0">
-              <a:buNone/>
-            </a:pPr>
-            <a:r>
-              <a:rPr lang="en-US" sz="1600" dirty="0"/>
-              <a:t>    String message = "The </a:t>
-            </a:r>
-            <a:r>
-              <a:rPr lang="en-US" sz="1600" dirty="0" err="1" smtClean="0"/>
-              <a:t>tiempo</a:t>
-            </a:r>
-            <a:r>
-              <a:rPr lang="en-US" sz="1600" dirty="0" smtClean="0"/>
-              <a:t> </a:t>
-            </a:r>
-            <a:r>
-              <a:rPr lang="en-US" sz="1600" dirty="0" err="1" smtClean="0"/>
-              <a:t>fue</a:t>
-            </a:r>
-            <a:r>
-              <a:rPr lang="en-US" sz="1600" dirty="0" smtClean="0"/>
-              <a:t> </a:t>
-            </a:r>
-            <a:r>
-              <a:rPr lang="en-US" sz="1600" dirty="0"/>
-              <a:t>" + String(</a:t>
-            </a:r>
-            <a:r>
-              <a:rPr lang="en-US" sz="1600" dirty="0" err="1"/>
-              <a:t>hitTime</a:t>
-            </a:r>
-            <a:r>
-              <a:rPr lang="en-US" sz="1600" dirty="0"/>
-              <a:t>) + " </a:t>
-            </a:r>
-            <a:r>
-              <a:rPr lang="en-US" sz="1600" dirty="0" err="1" smtClean="0"/>
-              <a:t>microsegundos</a:t>
-            </a:r>
-            <a:r>
-              <a:rPr lang="en-US" sz="1600" dirty="0" smtClean="0"/>
-              <a:t>\n</a:t>
-            </a:r>
-            <a:r>
-              <a:rPr lang="en-US" sz="1600" dirty="0"/>
-              <a:t>";</a:t>
-            </a:r>
-          </a:p>
-          <a:p>
-            <a:pPr marL="0" indent="0">
-              <a:buNone/>
-            </a:pPr>
-            <a:r>
-              <a:rPr lang="en-US" sz="1600" dirty="0" smtClean="0"/>
-              <a:t>if</a:t>
-            </a:r>
-            <a:r>
-              <a:rPr lang="en-US" sz="1600" dirty="0"/>
-              <a:t>((</a:t>
-            </a:r>
-            <a:r>
-              <a:rPr lang="en-US" sz="1600" dirty="0" err="1"/>
-              <a:t>hitTime</a:t>
-            </a:r>
-            <a:r>
-              <a:rPr lang="en-US" sz="1600" dirty="0"/>
-              <a:t> == 0) &amp;&amp; (</a:t>
-            </a:r>
-            <a:r>
-              <a:rPr lang="en-US" sz="1600" dirty="0" err="1"/>
-              <a:t>ultrasonicSensor.getTimeout</a:t>
-            </a:r>
-            <a:r>
-              <a:rPr lang="en-US" sz="1600" dirty="0"/>
-              <a:t>() == 5000)) {</a:t>
-            </a:r>
-          </a:p>
-          <a:p>
-            <a:pPr marL="0" indent="0">
-              <a:buNone/>
-            </a:pPr>
-            <a:r>
-              <a:rPr lang="en-US" sz="1600" dirty="0"/>
-              <a:t>        </a:t>
-            </a:r>
-            <a:r>
-              <a:rPr lang="en-US" sz="1600" dirty="0" err="1"/>
-              <a:t>ultrasonicSensor.setTimeout</a:t>
-            </a:r>
-            <a:r>
-              <a:rPr lang="en-US" sz="1600" dirty="0"/>
-              <a:t>(23200);</a:t>
-            </a:r>
-          </a:p>
-          <a:p>
-            <a:pPr marL="0" indent="0">
-              <a:buNone/>
-            </a:pPr>
-            <a:r>
-              <a:rPr lang="en-US" sz="1600" dirty="0" smtClean="0"/>
-              <a:t>        </a:t>
-            </a:r>
-            <a:r>
-              <a:rPr lang="en-US" sz="1600" dirty="0"/>
-              <a:t>message += "[!] Timeout </a:t>
-            </a:r>
-            <a:r>
-              <a:rPr lang="en-US" sz="1600" dirty="0" err="1" smtClean="0"/>
-              <a:t>incrementado</a:t>
-            </a:r>
-            <a:r>
-              <a:rPr lang="en-US" sz="1600" dirty="0" smtClean="0"/>
-              <a:t> de 5000 </a:t>
-            </a:r>
-            <a:r>
-              <a:rPr lang="en-US" sz="1600" dirty="0"/>
-              <a:t>to 23200\n";</a:t>
-            </a:r>
-          </a:p>
-          <a:p>
-            <a:pPr marL="0" indent="0">
-              <a:buNone/>
-            </a:pPr>
-            <a:r>
-              <a:rPr lang="en-US" sz="1600" dirty="0"/>
-              <a:t>        message += "[!] </a:t>
-            </a:r>
-            <a:r>
-              <a:rPr lang="en-US" sz="1600" dirty="0" err="1" smtClean="0"/>
-              <a:t>si</a:t>
-            </a:r>
-            <a:r>
-              <a:rPr lang="en-US" sz="1600" dirty="0" smtClean="0"/>
-              <a:t> el </a:t>
-            </a:r>
-            <a:r>
-              <a:rPr lang="en-US" sz="1600" dirty="0" err="1" smtClean="0"/>
-              <a:t>tiempo</a:t>
-            </a:r>
-            <a:r>
-              <a:rPr lang="en-US" sz="1600" dirty="0" smtClean="0"/>
-              <a:t> </a:t>
-            </a:r>
-            <a:r>
-              <a:rPr lang="en-US" sz="1600" dirty="0" err="1" smtClean="0"/>
-              <a:t>es</a:t>
-            </a:r>
-            <a:r>
-              <a:rPr lang="en-US" sz="1600" dirty="0" smtClean="0"/>
-              <a:t> 0 </a:t>
-            </a:r>
-            <a:r>
-              <a:rPr lang="en-US" sz="1600" dirty="0" err="1" smtClean="0"/>
-              <a:t>despues</a:t>
-            </a:r>
-            <a:r>
-              <a:rPr lang="en-US" sz="1600" dirty="0" smtClean="0"/>
-              <a:t> de </a:t>
-            </a:r>
-            <a:r>
-              <a:rPr lang="en-US" sz="1600" dirty="0" err="1" smtClean="0"/>
-              <a:t>este</a:t>
-            </a:r>
-            <a:r>
-              <a:rPr lang="en-US" sz="1600" dirty="0" smtClean="0"/>
-              <a:t> </a:t>
-            </a:r>
-            <a:r>
-              <a:rPr lang="en-US" sz="1600" dirty="0" err="1" smtClean="0"/>
-              <a:t>mensaje</a:t>
-            </a:r>
-            <a:r>
-              <a:rPr lang="en-US" sz="1600" dirty="0" smtClean="0"/>
-              <a:t>, \n“;</a:t>
-            </a:r>
-            <a:endParaRPr lang="en-US" sz="1600" dirty="0"/>
-          </a:p>
-          <a:p>
-            <a:pPr marL="0" indent="0">
-              <a:buNone/>
-            </a:pPr>
-            <a:r>
-              <a:rPr lang="en-US" sz="1600" dirty="0" smtClean="0"/>
-              <a:t>}</a:t>
-            </a:r>
-            <a:endParaRPr lang="en-US" sz="1600" dirty="0"/>
-          </a:p>
-          <a:p>
-            <a:pPr marL="0" indent="0">
-              <a:buNone/>
-            </a:pPr>
-            <a:r>
-              <a:rPr lang="en-US" sz="1600" dirty="0"/>
-              <a:t>    </a:t>
-            </a:r>
-            <a:r>
-              <a:rPr lang="en-US" sz="1600" dirty="0" err="1"/>
-              <a:t>Serial.print</a:t>
-            </a:r>
-            <a:r>
-              <a:rPr lang="en-US" sz="1600" dirty="0"/>
-              <a:t>(message</a:t>
-            </a:r>
-            <a:r>
-              <a:rPr lang="en-US" sz="1600" dirty="0" smtClean="0"/>
-              <a:t>);</a:t>
-            </a:r>
-            <a:endParaRPr lang="en-US" sz="1600" dirty="0"/>
-          </a:p>
-          <a:p>
-            <a:pPr marL="0" indent="0">
-              <a:buNone/>
-            </a:pPr>
-            <a:r>
-              <a:rPr lang="en-US" sz="1600" dirty="0"/>
-              <a:t>    delay(1500</a:t>
-            </a:r>
-            <a:r>
-              <a:rPr lang="en-US" sz="1600" dirty="0" smtClean="0"/>
-              <a:t>);</a:t>
-            </a:r>
-          </a:p>
-          <a:p>
-            <a:pPr marL="0" indent="0">
-              <a:buNone/>
-            </a:pPr>
-            <a:r>
-              <a:rPr lang="en-US" sz="1600" dirty="0" smtClean="0"/>
-              <a:t>}</a:t>
-            </a:r>
-            <a:endParaRPr lang="es-ES" sz="1600" dirty="0"/>
-          </a:p>
-        </p:txBody>
-      </p:sp>
-    </p:spTree>
-    <p:extLst>
-      <p:ext uri="{BB962C8B-B14F-4D97-AF65-F5344CB8AC3E}">
-        <p14:creationId xmlns:p14="http://schemas.microsoft.com/office/powerpoint/2010/main" val="4225102005"/>
-      </p:ext>
-    </p:extLst>
-  </p:cSld>
-  <p:clrMapOvr>
-    <a:masterClrMapping/>
-  </p:clrMapOvr>
-</p:sld>
-</file>
-
 <file path=ppt/slides/slide9.xml><?xml version="1.0" encoding="utf-8"?>
 <p:sld xmlns:a="http://schemas.openxmlformats.org/drawingml/2006/main" xmlns:r="http://schemas.openxmlformats.org/officeDocument/2006/relationships" xmlns:p="http://schemas.openxmlformats.org/presentationml/2006/main">
   <p:cSld>
@@ -13042,103 +13123,399 @@
           <a:p>
             <a:r>
               <a:rPr lang="es-CL" dirty="0" smtClean="0"/>
-              <a:t>Sensor DHT11</a:t>
+              <a:t>HC-SR04 Ejemplo</a:t>
             </a:r>
             <a:endParaRPr lang="es-ES" dirty="0"/>
           </a:p>
         </p:txBody>
       </p:sp>
-      <p:pic>
-        <p:nvPicPr>
-          <p:cNvPr id="4" name="Marcador de contenido 3"/>
-          <p:cNvPicPr>
-            <a:picLocks noGrp="1" noChangeAspect="1"/>
-          </p:cNvPicPr>
+      <p:sp>
+        <p:nvSpPr>
+          <p:cNvPr id="3" name="Marcador de contenido 2"/>
+          <p:cNvSpPr>
+            <a:spLocks noGrp="1"/>
+          </p:cNvSpPr>
           <p:nvPr>
             <p:ph idx="1"/>
           </p:nvPr>
-        </p:nvPicPr>
-        <p:blipFill>
-          <a:blip r:embed="rId2"/>
-          <a:stretch>
-            <a:fillRect/>
-          </a:stretch>
-        </p:blipFill>
+        </p:nvSpPr>
         <p:spPr>
           <a:xfrm>
-            <a:off x="1105184" y="1417638"/>
-            <a:ext cx="4082410" cy="4082410"/>
+            <a:off x="609600" y="1417638"/>
+            <a:ext cx="10972800" cy="4525963"/>
           </a:xfrm>
-          <a:prstGeom prst="rect">
-            <a:avLst/>
-          </a:prstGeom>
         </p:spPr>
-      </p:pic>
-      <p:sp>
-        <p:nvSpPr>
-          <p:cNvPr id="5" name="CuadroTexto 4"/>
-          <p:cNvSpPr txBox="1"/>
-          <p:nvPr/>
-        </p:nvSpPr>
-        <p:spPr>
-          <a:xfrm>
-            <a:off x="5663821" y="2183642"/>
-            <a:ext cx="5650173" cy="954107"/>
-          </a:xfrm>
-          <a:prstGeom prst="rect">
-            <a:avLst/>
-          </a:prstGeom>
-          <a:noFill/>
-        </p:spPr>
-        <p:txBody>
-          <a:bodyPr wrap="square" rtlCol="0">
-            <a:spAutoFit/>
+        <p:txBody>
+          <a:bodyPr>
+            <a:noAutofit/>
           </a:bodyPr>
           <a:lstStyle/>
           <a:p>
-            <a:pPr marL="285750" indent="-285750">
-              <a:buFont typeface="Arial" panose="020B0604020202020204" pitchFamily="34" charset="0"/>
-              <a:buChar char="•"/>
+            <a:pPr marL="0" indent="0">
+              <a:buNone/>
             </a:pPr>
             <a:r>
-              <a:rPr lang="es-CL" sz="2800" dirty="0" smtClean="0"/>
-              <a:t>Temperatura (°C)</a:t>
-            </a:r>
-          </a:p>
-          <a:p>
-            <a:pPr marL="285750" indent="-285750">
-              <a:buFont typeface="Arial" panose="020B0604020202020204" pitchFamily="34" charset="0"/>
-              <a:buChar char="•"/>
+              <a:rPr lang="en-US" sz="1600" dirty="0" smtClean="0"/>
+              <a:t>#</a:t>
+            </a:r>
+            <a:r>
+              <a:rPr lang="en-US" sz="1600" dirty="0"/>
+              <a:t>include &lt;ST_HW_HC_SR04.h&gt;</a:t>
+            </a:r>
+          </a:p>
+          <a:p>
+            <a:pPr marL="0" indent="0">
+              <a:buNone/>
             </a:pPr>
             <a:r>
-              <a:rPr lang="es-CL" sz="2800" dirty="0" smtClean="0"/>
-              <a:t>Humedad ambiente (%</a:t>
-            </a:r>
-            <a:r>
-              <a:rPr lang="es-ES" sz="2800" dirty="0"/>
-              <a:t>)</a:t>
-            </a:r>
-            <a:endParaRPr lang="es-CL" sz="2800" dirty="0" smtClean="0"/>
+              <a:rPr lang="en-US" sz="1600" dirty="0" smtClean="0"/>
+              <a:t>ST_HW_HC_SR04 </a:t>
+            </a:r>
+            <a:r>
+              <a:rPr lang="en-US" sz="1600" dirty="0" err="1"/>
+              <a:t>ultrasonicSensor</a:t>
+            </a:r>
+            <a:r>
+              <a:rPr lang="en-US" sz="1600" dirty="0"/>
+              <a:t>(13, 12); // ST_HW_HC_SR04(TRIG, ECHO)</a:t>
+            </a:r>
+          </a:p>
+          <a:p>
+            <a:pPr marL="0" indent="0">
+              <a:buNone/>
+            </a:pPr>
+            <a:r>
+              <a:rPr lang="en-US" sz="1600" dirty="0" smtClean="0"/>
+              <a:t>void </a:t>
+            </a:r>
+            <a:r>
+              <a:rPr lang="en-US" sz="1600" dirty="0"/>
+              <a:t>setup() {</a:t>
+            </a:r>
+          </a:p>
+          <a:p>
+            <a:pPr marL="0" indent="0">
+              <a:buNone/>
+            </a:pPr>
+            <a:r>
+              <a:rPr lang="en-US" sz="1600" dirty="0"/>
+              <a:t>    </a:t>
+            </a:r>
+            <a:r>
+              <a:rPr lang="en-US" sz="1600" dirty="0" err="1"/>
+              <a:t>Serial.begin</a:t>
+            </a:r>
+            <a:r>
+              <a:rPr lang="en-US" sz="1600" dirty="0"/>
+              <a:t>(9600</a:t>
+            </a:r>
+            <a:r>
+              <a:rPr lang="en-US" sz="1600" dirty="0" smtClean="0"/>
+              <a:t>);</a:t>
+            </a:r>
+            <a:endParaRPr lang="en-US" sz="1600" dirty="0"/>
+          </a:p>
+          <a:p>
+            <a:pPr marL="0" indent="0">
+              <a:buNone/>
+            </a:pPr>
+            <a:r>
+              <a:rPr lang="en-US" sz="1600" dirty="0" smtClean="0"/>
+              <a:t>}</a:t>
+            </a:r>
+            <a:endParaRPr lang="en-US" sz="1600" dirty="0"/>
+          </a:p>
+          <a:p>
+            <a:pPr marL="0" indent="0">
+              <a:buNone/>
+            </a:pPr>
+            <a:r>
+              <a:rPr lang="en-US" sz="1600" dirty="0" smtClean="0"/>
+              <a:t>void </a:t>
+            </a:r>
+            <a:r>
+              <a:rPr lang="en-US" sz="1600" dirty="0"/>
+              <a:t>loop() {</a:t>
+            </a:r>
+          </a:p>
+          <a:p>
+            <a:pPr marL="0" indent="0">
+              <a:buNone/>
+            </a:pPr>
+            <a:r>
+              <a:rPr lang="en-US" sz="1600" dirty="0"/>
+              <a:t>    </a:t>
+            </a:r>
+            <a:r>
+              <a:rPr lang="en-US" sz="1600" dirty="0" err="1"/>
+              <a:t>int</a:t>
+            </a:r>
+            <a:r>
+              <a:rPr lang="en-US" sz="1600" dirty="0"/>
+              <a:t> </a:t>
+            </a:r>
+            <a:r>
+              <a:rPr lang="en-US" sz="1600" dirty="0" err="1"/>
+              <a:t>hitTime</a:t>
+            </a:r>
+            <a:r>
+              <a:rPr lang="en-US" sz="1600" dirty="0"/>
+              <a:t> = </a:t>
+            </a:r>
+            <a:r>
+              <a:rPr lang="en-US" sz="1600" dirty="0" err="1"/>
+              <a:t>ultrasonicSensor.getHitTime</a:t>
+            </a:r>
+            <a:r>
+              <a:rPr lang="en-US" sz="1600" dirty="0"/>
+              <a:t>(); </a:t>
+            </a:r>
+          </a:p>
+          <a:p>
+            <a:pPr marL="0" indent="0">
+              <a:buNone/>
+            </a:pPr>
+            <a:r>
+              <a:rPr lang="en-US" sz="1600" dirty="0"/>
+              <a:t>    String message = "The </a:t>
+            </a:r>
+            <a:r>
+              <a:rPr lang="en-US" sz="1600" dirty="0" err="1" smtClean="0"/>
+              <a:t>tiempo</a:t>
+            </a:r>
+            <a:r>
+              <a:rPr lang="en-US" sz="1600" dirty="0" smtClean="0"/>
+              <a:t> </a:t>
+            </a:r>
+            <a:r>
+              <a:rPr lang="en-US" sz="1600" dirty="0" err="1" smtClean="0"/>
+              <a:t>fue</a:t>
+            </a:r>
+            <a:r>
+              <a:rPr lang="en-US" sz="1600" dirty="0" smtClean="0"/>
+              <a:t> </a:t>
+            </a:r>
+            <a:r>
+              <a:rPr lang="en-US" sz="1600" dirty="0"/>
+              <a:t>" + String(</a:t>
+            </a:r>
+            <a:r>
+              <a:rPr lang="en-US" sz="1600" dirty="0" err="1"/>
+              <a:t>hitTime</a:t>
+            </a:r>
+            <a:r>
+              <a:rPr lang="en-US" sz="1600" dirty="0"/>
+              <a:t>) + " </a:t>
+            </a:r>
+            <a:r>
+              <a:rPr lang="en-US" sz="1600" dirty="0" err="1" smtClean="0"/>
+              <a:t>microsegundos</a:t>
+            </a:r>
+            <a:r>
+              <a:rPr lang="en-US" sz="1600" dirty="0" smtClean="0"/>
+              <a:t>\n</a:t>
+            </a:r>
+            <a:r>
+              <a:rPr lang="en-US" sz="1600" dirty="0"/>
+              <a:t>";</a:t>
+            </a:r>
+          </a:p>
+          <a:p>
+            <a:pPr marL="0" indent="0">
+              <a:buNone/>
+            </a:pPr>
+            <a:r>
+              <a:rPr lang="en-US" sz="1600" dirty="0" smtClean="0"/>
+              <a:t>if</a:t>
+            </a:r>
+            <a:r>
+              <a:rPr lang="en-US" sz="1600" dirty="0"/>
+              <a:t>((</a:t>
+            </a:r>
+            <a:r>
+              <a:rPr lang="en-US" sz="1600" dirty="0" err="1"/>
+              <a:t>hitTime</a:t>
+            </a:r>
+            <a:r>
+              <a:rPr lang="en-US" sz="1600" dirty="0"/>
+              <a:t> == 0) &amp;&amp; (</a:t>
+            </a:r>
+            <a:r>
+              <a:rPr lang="en-US" sz="1600" dirty="0" err="1"/>
+              <a:t>ultrasonicSensor.getTimeout</a:t>
+            </a:r>
+            <a:r>
+              <a:rPr lang="en-US" sz="1600" dirty="0"/>
+              <a:t>() == 5000)) {</a:t>
+            </a:r>
+          </a:p>
+          <a:p>
+            <a:pPr marL="0" indent="0">
+              <a:buNone/>
+            </a:pPr>
+            <a:r>
+              <a:rPr lang="en-US" sz="1600" dirty="0"/>
+              <a:t>        </a:t>
+            </a:r>
+            <a:r>
+              <a:rPr lang="en-US" sz="1600" dirty="0" err="1"/>
+              <a:t>ultrasonicSensor.setTimeout</a:t>
+            </a:r>
+            <a:r>
+              <a:rPr lang="en-US" sz="1600" dirty="0"/>
+              <a:t>(23200);</a:t>
+            </a:r>
+          </a:p>
+          <a:p>
+            <a:pPr marL="0" indent="0">
+              <a:buNone/>
+            </a:pPr>
+            <a:r>
+              <a:rPr lang="en-US" sz="1600" dirty="0" smtClean="0"/>
+              <a:t>        </a:t>
+            </a:r>
+            <a:r>
+              <a:rPr lang="en-US" sz="1600" dirty="0"/>
+              <a:t>message += "[!] Timeout </a:t>
+            </a:r>
+            <a:r>
+              <a:rPr lang="en-US" sz="1600" dirty="0" err="1" smtClean="0"/>
+              <a:t>incrementado</a:t>
+            </a:r>
+            <a:r>
+              <a:rPr lang="en-US" sz="1600" dirty="0" smtClean="0"/>
+              <a:t> de 5000 </a:t>
+            </a:r>
+            <a:r>
+              <a:rPr lang="en-US" sz="1600" dirty="0"/>
+              <a:t>to 23200\n";</a:t>
+            </a:r>
+          </a:p>
+          <a:p>
+            <a:pPr marL="0" indent="0">
+              <a:buNone/>
+            </a:pPr>
+            <a:r>
+              <a:rPr lang="en-US" sz="1600" dirty="0"/>
+              <a:t>        message += "[!] </a:t>
+            </a:r>
+            <a:r>
+              <a:rPr lang="en-US" sz="1600" dirty="0" err="1" smtClean="0"/>
+              <a:t>si</a:t>
+            </a:r>
+            <a:r>
+              <a:rPr lang="en-US" sz="1600" dirty="0" smtClean="0"/>
+              <a:t> el </a:t>
+            </a:r>
+            <a:r>
+              <a:rPr lang="en-US" sz="1600" dirty="0" err="1" smtClean="0"/>
+              <a:t>tiempo</a:t>
+            </a:r>
+            <a:r>
+              <a:rPr lang="en-US" sz="1600" dirty="0" smtClean="0"/>
+              <a:t> </a:t>
+            </a:r>
+            <a:r>
+              <a:rPr lang="en-US" sz="1600" dirty="0" err="1" smtClean="0"/>
+              <a:t>es</a:t>
+            </a:r>
+            <a:r>
+              <a:rPr lang="en-US" sz="1600" dirty="0" smtClean="0"/>
+              <a:t> 0 </a:t>
+            </a:r>
+            <a:r>
+              <a:rPr lang="en-US" sz="1600" dirty="0" err="1" smtClean="0"/>
+              <a:t>despues</a:t>
+            </a:r>
+            <a:r>
+              <a:rPr lang="en-US" sz="1600" dirty="0" smtClean="0"/>
+              <a:t> de </a:t>
+            </a:r>
+            <a:r>
+              <a:rPr lang="en-US" sz="1600" dirty="0" err="1" smtClean="0"/>
+              <a:t>este</a:t>
+            </a:r>
+            <a:r>
+              <a:rPr lang="en-US" sz="1600" dirty="0" smtClean="0"/>
+              <a:t> </a:t>
+            </a:r>
+            <a:r>
+              <a:rPr lang="en-US" sz="1600" dirty="0" err="1" smtClean="0"/>
+              <a:t>mensaje</a:t>
+            </a:r>
+            <a:r>
+              <a:rPr lang="en-US" sz="1600" dirty="0" smtClean="0"/>
+              <a:t>, \n“;</a:t>
+            </a:r>
+            <a:endParaRPr lang="en-US" sz="1600" dirty="0"/>
+          </a:p>
+          <a:p>
+            <a:pPr marL="0" indent="0">
+              <a:buNone/>
+            </a:pPr>
+            <a:r>
+              <a:rPr lang="en-US" sz="1600" dirty="0" smtClean="0"/>
+              <a:t>}</a:t>
+            </a:r>
+            <a:endParaRPr lang="en-US" sz="1600" dirty="0"/>
+          </a:p>
+          <a:p>
+            <a:pPr marL="0" indent="0">
+              <a:buNone/>
+            </a:pPr>
+            <a:r>
+              <a:rPr lang="en-US" sz="1600" dirty="0"/>
+              <a:t>    </a:t>
+            </a:r>
+            <a:r>
+              <a:rPr lang="en-US" sz="1600" dirty="0" err="1"/>
+              <a:t>Serial.print</a:t>
+            </a:r>
+            <a:r>
+              <a:rPr lang="en-US" sz="1600" dirty="0"/>
+              <a:t>(message</a:t>
+            </a:r>
+            <a:r>
+              <a:rPr lang="en-US" sz="1600" dirty="0" smtClean="0"/>
+              <a:t>);</a:t>
+            </a:r>
+            <a:endParaRPr lang="en-US" sz="1600" dirty="0"/>
+          </a:p>
+          <a:p>
+            <a:pPr marL="0" indent="0">
+              <a:buNone/>
+            </a:pPr>
+            <a:r>
+              <a:rPr lang="en-US" sz="1600" dirty="0"/>
+              <a:t>    delay(1500</a:t>
+            </a:r>
+            <a:r>
+              <a:rPr lang="en-US" sz="1600" dirty="0" smtClean="0"/>
+              <a:t>);</a:t>
+            </a:r>
+          </a:p>
+          <a:p>
+            <a:pPr marL="0" indent="0">
+              <a:buNone/>
+            </a:pPr>
+            <a:r>
+              <a:rPr lang="en-US" sz="1600" dirty="0" smtClean="0"/>
+              <a:t>}</a:t>
+            </a:r>
+            <a:endParaRPr lang="es-ES" sz="1600" dirty="0"/>
           </a:p>
         </p:txBody>
       </p:sp>
     </p:spTree>
     <p:extLst>
       <p:ext uri="{BB962C8B-B14F-4D97-AF65-F5344CB8AC3E}">
-        <p14:creationId xmlns:p14="http://schemas.microsoft.com/office/powerpoint/2010/main" val="3485866404"/>
+        <p14:creationId xmlns:p14="http://schemas.microsoft.com/office/powerpoint/2010/main" val="4225102005"/>
       </p:ext>
     </p:extLst>
   </p:cSld>
   <p:clrMapOvr>
     <a:masterClrMapping/>
   </p:clrMapOvr>
-  <p:timing>
-    <p:tnLst>
-      <p:par>
-        <p:cTn id="1" dur="indefinite" restart="never" nodeType="tmRoot"/>
-      </p:par>
-    </p:tnLst>
-  </p:timing>
 </p:sld>
 </file>
 

</xml_diff>